<commit_message>
fix(pages): visage=>layout pour clarté avec integration du storyboard notamment
</commit_message>
<xml_diff>
--- a/supports/07-navigation.pptx
+++ b/supports/07-navigation.pptx
@@ -5,17 +5,18 @@
     <p:sldMasterId id="2147483660" r:id="rId4"/>
   </p:sldMasterIdLst>
   <p:notesMasterIdLst>
-    <p:notesMasterId r:id="rId13"/>
+    <p:notesMasterId r:id="rId14"/>
   </p:notesMasterIdLst>
   <p:sldIdLst>
     <p:sldId id="256" r:id="rId5"/>
     <p:sldId id="257" r:id="rId6"/>
     <p:sldId id="262" r:id="rId7"/>
     <p:sldId id="258" r:id="rId8"/>
-    <p:sldId id="259" r:id="rId9"/>
-    <p:sldId id="261" r:id="rId10"/>
+    <p:sldId id="265" r:id="rId9"/>
+    <p:sldId id="259" r:id="rId10"/>
     <p:sldId id="264" r:id="rId11"/>
-    <p:sldId id="263" r:id="rId12"/>
+    <p:sldId id="261" r:id="rId12"/>
+    <p:sldId id="263" r:id="rId13"/>
   </p:sldIdLst>
   <p:sldSz cx="12192000" cy="6858000"/>
   <p:notesSz cx="6858000" cy="9144000"/>
@@ -133,221 +134,130 @@
 <file path=ppt/changesInfos/changesInfo1.xml><?xml version="1.0" encoding="utf-8"?>
 <pc:chgInfo xmlns:a="http://schemas.openxmlformats.org/drawingml/2006/main" xmlns:r="http://schemas.openxmlformats.org/officeDocument/2006/relationships" xmlns:ac="http://schemas.microsoft.com/office/drawing/2013/main/command" xmlns:pc="http://schemas.microsoft.com/office/powerpoint/2013/main/command">
   <pc:docChgLst>
-    <pc:chgData name="Jonathan Melly" userId="a7718738-f2aa-4d1b-bcf4-5a9c900fe107" providerId="ADAL" clId="{9C085848-E882-45A4-9D27-435D8B509D88}"/>
-    <pc:docChg chg="custSel addSld delSld modSld">
-      <pc:chgData name="Jonathan Melly" userId="a7718738-f2aa-4d1b-bcf4-5a9c900fe107" providerId="ADAL" clId="{9C085848-E882-45A4-9D27-435D8B509D88}" dt="2024-01-19T10:16:36.749" v="328" actId="1076"/>
+    <pc:chgData name="Jonathan Melly" userId="a7718738-f2aa-4d1b-bcf4-5a9c900fe107" providerId="ADAL" clId="{1F1688F6-D224-4ACD-9032-0C69C37BD645}"/>
+    <pc:docChg chg="undo custSel addSld modSld">
+      <pc:chgData name="Jonathan Melly" userId="a7718738-f2aa-4d1b-bcf4-5a9c900fe107" providerId="ADAL" clId="{1F1688F6-D224-4ACD-9032-0C69C37BD645}" dt="2024-03-08T13:37:03.781" v="144"/>
       <pc:docMkLst>
         <pc:docMk/>
       </pc:docMkLst>
-      <pc:sldChg chg="modSp new mod">
-        <pc:chgData name="Jonathan Melly" userId="a7718738-f2aa-4d1b-bcf4-5a9c900fe107" providerId="ADAL" clId="{9C085848-E882-45A4-9D27-435D8B509D88}" dt="2024-01-12T15:01:02.398" v="25"/>
+      <pc:sldChg chg="addSp delSp modSp new mod modAnim">
+        <pc:chgData name="Jonathan Melly" userId="a7718738-f2aa-4d1b-bcf4-5a9c900fe107" providerId="ADAL" clId="{1F1688F6-D224-4ACD-9032-0C69C37BD645}" dt="2024-03-08T13:37:03.781" v="144"/>
         <pc:sldMkLst>
           <pc:docMk/>
-          <pc:sldMk cId="2286386300" sldId="256"/>
+          <pc:sldMk cId="1682411159" sldId="264"/>
         </pc:sldMkLst>
         <pc:spChg chg="mod">
-          <ac:chgData name="Jonathan Melly" userId="a7718738-f2aa-4d1b-bcf4-5a9c900fe107" providerId="ADAL" clId="{9C085848-E882-45A4-9D27-435D8B509D88}" dt="2024-01-12T15:01:02.398" v="25"/>
+          <ac:chgData name="Jonathan Melly" userId="a7718738-f2aa-4d1b-bcf4-5a9c900fe107" providerId="ADAL" clId="{1F1688F6-D224-4ACD-9032-0C69C37BD645}" dt="2024-03-08T10:38:14.518" v="50" actId="20577"/>
           <ac:spMkLst>
             <pc:docMk/>
-            <pc:sldMk cId="2286386300" sldId="256"/>
-            <ac:spMk id="2" creationId="{FCAD736B-19A3-8E64-E7BD-5957E686660D}"/>
-          </ac:spMkLst>
-        </pc:spChg>
-        <pc:spChg chg="mod">
-          <ac:chgData name="Jonathan Melly" userId="a7718738-f2aa-4d1b-bcf4-5a9c900fe107" providerId="ADAL" clId="{9C085848-E882-45A4-9D27-435D8B509D88}" dt="2024-01-12T15:01:02.398" v="25"/>
-          <ac:spMkLst>
-            <pc:docMk/>
-            <pc:sldMk cId="2286386300" sldId="256"/>
-            <ac:spMk id="3" creationId="{36FB8BB6-37F6-4FBE-4557-C829238518B7}"/>
-          </ac:spMkLst>
-        </pc:spChg>
-      </pc:sldChg>
-      <pc:sldChg chg="addSp delSp modSp new mod modNotesTx">
-        <pc:chgData name="Jonathan Melly" userId="a7718738-f2aa-4d1b-bcf4-5a9c900fe107" providerId="ADAL" clId="{9C085848-E882-45A4-9D27-435D8B509D88}" dt="2024-01-12T15:02:13.885" v="65" actId="20577"/>
-        <pc:sldMkLst>
-          <pc:docMk/>
-          <pc:sldMk cId="1540280923" sldId="257"/>
-        </pc:sldMkLst>
-        <pc:spChg chg="mod">
-          <ac:chgData name="Jonathan Melly" userId="a7718738-f2aa-4d1b-bcf4-5a9c900fe107" providerId="ADAL" clId="{9C085848-E882-45A4-9D27-435D8B509D88}" dt="2024-01-12T15:01:36.447" v="47" actId="20577"/>
-          <ac:spMkLst>
-            <pc:docMk/>
-            <pc:sldMk cId="1540280923" sldId="257"/>
-            <ac:spMk id="2" creationId="{AC7134BA-40D9-94A2-E1E5-7EC483439BE2}"/>
+            <pc:sldMk cId="1682411159" sldId="264"/>
+            <ac:spMk id="2" creationId="{7299DA15-6D43-EFFE-2BB5-B120C7929F15}"/>
           </ac:spMkLst>
         </pc:spChg>
         <pc:spChg chg="del">
-          <ac:chgData name="Jonathan Melly" userId="a7718738-f2aa-4d1b-bcf4-5a9c900fe107" providerId="ADAL" clId="{9C085848-E882-45A4-9D27-435D8B509D88}" dt="2024-01-12T15:00:48.107" v="24"/>
+          <ac:chgData name="Jonathan Melly" userId="a7718738-f2aa-4d1b-bcf4-5a9c900fe107" providerId="ADAL" clId="{1F1688F6-D224-4ACD-9032-0C69C37BD645}" dt="2024-03-08T13:27:55.132" v="55"/>
           <ac:spMkLst>
             <pc:docMk/>
-            <pc:sldMk cId="1540280923" sldId="257"/>
-            <ac:spMk id="3" creationId="{CB332372-0A8D-1940-788D-FBD05C184558}"/>
+            <pc:sldMk cId="1682411159" sldId="264"/>
+            <ac:spMk id="3" creationId="{E0F5172E-EA29-29DD-58E6-C5A8C57374F3}"/>
+          </ac:spMkLst>
+        </pc:spChg>
+        <pc:spChg chg="add mod">
+          <ac:chgData name="Jonathan Melly" userId="a7718738-f2aa-4d1b-bcf4-5a9c900fe107" providerId="ADAL" clId="{1F1688F6-D224-4ACD-9032-0C69C37BD645}" dt="2024-03-08T13:30:16.008" v="75" actId="207"/>
+          <ac:spMkLst>
+            <pc:docMk/>
+            <pc:sldMk cId="1682411159" sldId="264"/>
+            <ac:spMk id="12" creationId="{BA188E49-1D75-BE92-6760-D72D8F749B4B}"/>
+          </ac:spMkLst>
+        </pc:spChg>
+        <pc:spChg chg="add mod">
+          <ac:chgData name="Jonathan Melly" userId="a7718738-f2aa-4d1b-bcf4-5a9c900fe107" providerId="ADAL" clId="{1F1688F6-D224-4ACD-9032-0C69C37BD645}" dt="2024-03-08T13:30:44.416" v="80" actId="14100"/>
+          <ac:spMkLst>
+            <pc:docMk/>
+            <pc:sldMk cId="1682411159" sldId="264"/>
+            <ac:spMk id="13" creationId="{8C58D3C6-D3EC-F340-55C4-94E95411708B}"/>
+          </ac:spMkLst>
+        </pc:spChg>
+        <pc:spChg chg="add mod">
+          <ac:chgData name="Jonathan Melly" userId="a7718738-f2aa-4d1b-bcf4-5a9c900fe107" providerId="ADAL" clId="{1F1688F6-D224-4ACD-9032-0C69C37BD645}" dt="2024-03-08T13:30:48.245" v="82" actId="1076"/>
+          <ac:spMkLst>
+            <pc:docMk/>
+            <pc:sldMk cId="1682411159" sldId="264"/>
+            <ac:spMk id="14" creationId="{17B7CDF6-1887-D41E-7DCA-6C0E6F28342A}"/>
+          </ac:spMkLst>
+        </pc:spChg>
+        <pc:spChg chg="add mod">
+          <ac:chgData name="Jonathan Melly" userId="a7718738-f2aa-4d1b-bcf4-5a9c900fe107" providerId="ADAL" clId="{1F1688F6-D224-4ACD-9032-0C69C37BD645}" dt="2024-03-08T13:34:14.359" v="126" actId="1076"/>
+          <ac:spMkLst>
+            <pc:docMk/>
+            <pc:sldMk cId="1682411159" sldId="264"/>
+            <ac:spMk id="21" creationId="{A2DE6599-8B04-F8F1-0178-13B6DF522AB6}"/>
+          </ac:spMkLst>
+        </pc:spChg>
+        <pc:spChg chg="add mod">
+          <ac:chgData name="Jonathan Melly" userId="a7718738-f2aa-4d1b-bcf4-5a9c900fe107" providerId="ADAL" clId="{1F1688F6-D224-4ACD-9032-0C69C37BD645}" dt="2024-03-08T13:36:57.117" v="143" actId="1076"/>
+          <ac:spMkLst>
+            <pc:docMk/>
+            <pc:sldMk cId="1682411159" sldId="264"/>
+            <ac:spMk id="22" creationId="{C7541621-CD2F-541E-AC60-9BEFC581F957}"/>
           </ac:spMkLst>
         </pc:spChg>
         <pc:picChg chg="add mod">
-          <ac:chgData name="Jonathan Melly" userId="a7718738-f2aa-4d1b-bcf4-5a9c900fe107" providerId="ADAL" clId="{9C085848-E882-45A4-9D27-435D8B509D88}" dt="2024-01-12T15:01:02.398" v="25"/>
+          <ac:chgData name="Jonathan Melly" userId="a7718738-f2aa-4d1b-bcf4-5a9c900fe107" providerId="ADAL" clId="{1F1688F6-D224-4ACD-9032-0C69C37BD645}" dt="2024-03-08T13:34:08.479" v="125" actId="1076"/>
           <ac:picMkLst>
             <pc:docMk/>
-            <pc:sldMk cId="1540280923" sldId="257"/>
-            <ac:picMk id="1026" creationId="{E634AA88-B0DE-18FD-48DC-ACA8968ED85C}"/>
+            <pc:sldMk cId="1682411159" sldId="264"/>
+            <ac:picMk id="5" creationId="{219C7D86-CA7E-4C12-3FFE-28B484D4EBA2}"/>
           </ac:picMkLst>
         </pc:picChg>
-      </pc:sldChg>
-      <pc:sldChg chg="addSp delSp modSp new mod">
-        <pc:chgData name="Jonathan Melly" userId="a7718738-f2aa-4d1b-bcf4-5a9c900fe107" providerId="ADAL" clId="{9C085848-E882-45A4-9D27-435D8B509D88}" dt="2024-01-12T15:04:01.749" v="235" actId="20577"/>
-        <pc:sldMkLst>
-          <pc:docMk/>
-          <pc:sldMk cId="1768159204" sldId="258"/>
-        </pc:sldMkLst>
-        <pc:spChg chg="mod">
-          <ac:chgData name="Jonathan Melly" userId="a7718738-f2aa-4d1b-bcf4-5a9c900fe107" providerId="ADAL" clId="{9C085848-E882-45A4-9D27-435D8B509D88}" dt="2024-01-12T15:03:24.030" v="154" actId="20577"/>
-          <ac:spMkLst>
-            <pc:docMk/>
-            <pc:sldMk cId="1768159204" sldId="258"/>
-            <ac:spMk id="2" creationId="{C153CEAF-9A1B-7B25-E72A-95152A00875A}"/>
-          </ac:spMkLst>
-        </pc:spChg>
-        <pc:spChg chg="del">
-          <ac:chgData name="Jonathan Melly" userId="a7718738-f2aa-4d1b-bcf4-5a9c900fe107" providerId="ADAL" clId="{9C085848-E882-45A4-9D27-435D8B509D88}" dt="2024-01-12T15:02:31.265" v="96"/>
-          <ac:spMkLst>
-            <pc:docMk/>
-            <pc:sldMk cId="1768159204" sldId="258"/>
-            <ac:spMk id="3" creationId="{5654FF16-42ED-ABDB-8D78-0518B1F6A0D6}"/>
-          </ac:spMkLst>
-        </pc:spChg>
-        <pc:spChg chg="add mod">
-          <ac:chgData name="Jonathan Melly" userId="a7718738-f2aa-4d1b-bcf4-5a9c900fe107" providerId="ADAL" clId="{9C085848-E882-45A4-9D27-435D8B509D88}" dt="2024-01-12T15:04:01.749" v="235" actId="20577"/>
-          <ac:spMkLst>
-            <pc:docMk/>
-            <pc:sldMk cId="1768159204" sldId="258"/>
-            <ac:spMk id="4" creationId="{7D3276C4-FD62-9018-2781-5868F1128E3E}"/>
-          </ac:spMkLst>
-        </pc:spChg>
         <pc:picChg chg="add mod">
-          <ac:chgData name="Jonathan Melly" userId="a7718738-f2aa-4d1b-bcf4-5a9c900fe107" providerId="ADAL" clId="{9C085848-E882-45A4-9D27-435D8B509D88}" dt="2024-01-12T15:02:40.308" v="102" actId="1076"/>
+          <ac:chgData name="Jonathan Melly" userId="a7718738-f2aa-4d1b-bcf4-5a9c900fe107" providerId="ADAL" clId="{1F1688F6-D224-4ACD-9032-0C69C37BD645}" dt="2024-03-08T13:29:30.213" v="71" actId="1076"/>
           <ac:picMkLst>
             <pc:docMk/>
-            <pc:sldMk cId="1768159204" sldId="258"/>
-            <ac:picMk id="2050" creationId="{B3E21F42-2F98-749F-EE6F-AA36733F8C02}"/>
+            <pc:sldMk cId="1682411159" sldId="264"/>
+            <ac:picMk id="7" creationId="{6333F413-DE31-3137-4C06-93D9A6D777CA}"/>
           </ac:picMkLst>
         </pc:picChg>
-      </pc:sldChg>
-      <pc:sldChg chg="addSp delSp modSp new mod modAnim">
-        <pc:chgData name="Jonathan Melly" userId="a7718738-f2aa-4d1b-bcf4-5a9c900fe107" providerId="ADAL" clId="{9C085848-E882-45A4-9D27-435D8B509D88}" dt="2024-01-12T15:13:12.118" v="308"/>
-        <pc:sldMkLst>
-          <pc:docMk/>
-          <pc:sldMk cId="4088551538" sldId="259"/>
-        </pc:sldMkLst>
-        <pc:spChg chg="mod">
-          <ac:chgData name="Jonathan Melly" userId="a7718738-f2aa-4d1b-bcf4-5a9c900fe107" providerId="ADAL" clId="{9C085848-E882-45A4-9D27-435D8B509D88}" dt="2024-01-12T15:04:14.959" v="242" actId="20577"/>
-          <ac:spMkLst>
-            <pc:docMk/>
-            <pc:sldMk cId="4088551538" sldId="259"/>
-            <ac:spMk id="2" creationId="{43DE7D65-6535-E64A-072D-1919CF5318E2}"/>
-          </ac:spMkLst>
-        </pc:spChg>
-        <pc:spChg chg="del mod">
-          <ac:chgData name="Jonathan Melly" userId="a7718738-f2aa-4d1b-bcf4-5a9c900fe107" providerId="ADAL" clId="{9C085848-E882-45A4-9D27-435D8B509D88}" dt="2024-01-12T15:09:04.984" v="247" actId="478"/>
-          <ac:spMkLst>
-            <pc:docMk/>
-            <pc:sldMk cId="4088551538" sldId="259"/>
-            <ac:spMk id="3" creationId="{3D92B2E7-AF49-8BF3-5640-2C4A52035294}"/>
-          </ac:spMkLst>
-        </pc:spChg>
-        <pc:spChg chg="add mod">
-          <ac:chgData name="Jonathan Melly" userId="a7718738-f2aa-4d1b-bcf4-5a9c900fe107" providerId="ADAL" clId="{9C085848-E882-45A4-9D27-435D8B509D88}" dt="2024-01-12T15:10:03.570" v="281" actId="14"/>
-          <ac:spMkLst>
-            <pc:docMk/>
-            <pc:sldMk cId="4088551538" sldId="259"/>
-            <ac:spMk id="7" creationId="{1435E9AD-1F66-8917-AE32-DCFEEFD982F4}"/>
-          </ac:spMkLst>
-        </pc:spChg>
-        <pc:picChg chg="add mod">
-          <ac:chgData name="Jonathan Melly" userId="a7718738-f2aa-4d1b-bcf4-5a9c900fe107" providerId="ADAL" clId="{9C085848-E882-45A4-9D27-435D8B509D88}" dt="2024-01-12T15:09:14.534" v="250" actId="1076"/>
+        <pc:picChg chg="add del mod">
+          <ac:chgData name="Jonathan Melly" userId="a7718738-f2aa-4d1b-bcf4-5a9c900fe107" providerId="ADAL" clId="{1F1688F6-D224-4ACD-9032-0C69C37BD645}" dt="2024-03-08T13:28:55.629" v="60" actId="478"/>
           <ac:picMkLst>
             <pc:docMk/>
-            <pc:sldMk cId="4088551538" sldId="259"/>
-            <ac:picMk id="5" creationId="{3131A495-75ED-B1CD-C115-BF8DC7D9ACD2}"/>
+            <pc:sldMk cId="1682411159" sldId="264"/>
+            <ac:picMk id="9" creationId="{788B08FC-ACE0-6159-A9F3-093E21DF53DF}"/>
           </ac:picMkLst>
         </pc:picChg>
-        <pc:cxnChg chg="add">
-          <ac:chgData name="Jonathan Melly" userId="a7718738-f2aa-4d1b-bcf4-5a9c900fe107" providerId="ADAL" clId="{9C085848-E882-45A4-9D27-435D8B509D88}" dt="2024-01-12T15:11:10.798" v="285" actId="11529"/>
+        <pc:picChg chg="add mod">
+          <ac:chgData name="Jonathan Melly" userId="a7718738-f2aa-4d1b-bcf4-5a9c900fe107" providerId="ADAL" clId="{1F1688F6-D224-4ACD-9032-0C69C37BD645}" dt="2024-03-08T13:29:33.785" v="72" actId="1076"/>
+          <ac:picMkLst>
+            <pc:docMk/>
+            <pc:sldMk cId="1682411159" sldId="264"/>
+            <ac:picMk id="11" creationId="{BE5278CE-97E0-68DD-BFD0-45DD96675387}"/>
+          </ac:picMkLst>
+        </pc:picChg>
+        <pc:picChg chg="add mod">
+          <ac:chgData name="Jonathan Melly" userId="a7718738-f2aa-4d1b-bcf4-5a9c900fe107" providerId="ADAL" clId="{1F1688F6-D224-4ACD-9032-0C69C37BD645}" dt="2024-03-08T13:34:37.985" v="130" actId="1440"/>
+          <ac:picMkLst>
+            <pc:docMk/>
+            <pc:sldMk cId="1682411159" sldId="264"/>
+            <ac:picMk id="18" creationId="{7E6A3F0F-D63C-4126-41CF-DB9F4BBFA66B}"/>
+          </ac:picMkLst>
+        </pc:picChg>
+        <pc:cxnChg chg="add mod">
+          <ac:chgData name="Jonathan Melly" userId="a7718738-f2aa-4d1b-bcf4-5a9c900fe107" providerId="ADAL" clId="{1F1688F6-D224-4ACD-9032-0C69C37BD645}" dt="2024-03-08T13:31:01.801" v="84" actId="1582"/>
           <ac:cxnSpMkLst>
             <pc:docMk/>
-            <pc:sldMk cId="4088551538" sldId="259"/>
-            <ac:cxnSpMk id="9" creationId="{178A1D86-DC4E-C5BE-B2EB-C7E3F0A3E2E3}"/>
+            <pc:sldMk cId="1682411159" sldId="264"/>
+            <ac:cxnSpMk id="16" creationId="{CF6B2D61-35F4-E9B2-AC89-6F390A0753D1}"/>
           </ac:cxnSpMkLst>
         </pc:cxnChg>
         <pc:cxnChg chg="add mod">
-          <ac:chgData name="Jonathan Melly" userId="a7718738-f2aa-4d1b-bcf4-5a9c900fe107" providerId="ADAL" clId="{9C085848-E882-45A4-9D27-435D8B509D88}" dt="2024-01-12T15:11:18.261" v="288" actId="14100"/>
+          <ac:chgData name="Jonathan Melly" userId="a7718738-f2aa-4d1b-bcf4-5a9c900fe107" providerId="ADAL" clId="{1F1688F6-D224-4ACD-9032-0C69C37BD645}" dt="2024-03-08T13:33:29.405" v="101" actId="14100"/>
           <ac:cxnSpMkLst>
             <pc:docMk/>
-            <pc:sldMk cId="4088551538" sldId="259"/>
-            <ac:cxnSpMk id="10" creationId="{8F9C5BCE-FB46-70CF-A26D-325F56A0424B}"/>
+            <pc:sldMk cId="1682411159" sldId="264"/>
+            <ac:cxnSpMk id="19" creationId="{0EF3B47A-5D15-DE5C-4CE7-901594F4A978}"/>
           </ac:cxnSpMkLst>
         </pc:cxnChg>
-        <pc:cxnChg chg="add mod">
-          <ac:chgData name="Jonathan Melly" userId="a7718738-f2aa-4d1b-bcf4-5a9c900fe107" providerId="ADAL" clId="{9C085848-E882-45A4-9D27-435D8B509D88}" dt="2024-01-12T15:11:55.085" v="293" actId="13822"/>
-          <ac:cxnSpMkLst>
-            <pc:docMk/>
-            <pc:sldMk cId="4088551538" sldId="259"/>
-            <ac:cxnSpMk id="14" creationId="{92159152-3395-530D-3A65-18E4902D99AE}"/>
-          </ac:cxnSpMkLst>
-        </pc:cxnChg>
-        <pc:cxnChg chg="add mod">
-          <ac:chgData name="Jonathan Melly" userId="a7718738-f2aa-4d1b-bcf4-5a9c900fe107" providerId="ADAL" clId="{9C085848-E882-45A4-9D27-435D8B509D88}" dt="2024-01-12T15:12:01.310" v="296" actId="14100"/>
-          <ac:cxnSpMkLst>
-            <pc:docMk/>
-            <pc:sldMk cId="4088551538" sldId="259"/>
-            <ac:cxnSpMk id="15" creationId="{4E07FE43-38F6-A45D-7248-BE8E78E68624}"/>
-          </ac:cxnSpMkLst>
-        </pc:cxnChg>
-        <pc:cxnChg chg="add mod">
-          <ac:chgData name="Jonathan Melly" userId="a7718738-f2aa-4d1b-bcf4-5a9c900fe107" providerId="ADAL" clId="{9C085848-E882-45A4-9D27-435D8B509D88}" dt="2024-01-12T15:12:59.872" v="305" actId="13822"/>
-          <ac:cxnSpMkLst>
-            <pc:docMk/>
-            <pc:sldMk cId="4088551538" sldId="259"/>
-            <ac:cxnSpMk id="19" creationId="{1BBE4CE4-F0BD-ED13-2D33-498066D38D16}"/>
-          </ac:cxnSpMkLst>
-        </pc:cxnChg>
-      </pc:sldChg>
-      <pc:sldChg chg="addSp modSp new mod">
-        <pc:chgData name="Jonathan Melly" userId="a7718738-f2aa-4d1b-bcf4-5a9c900fe107" providerId="ADAL" clId="{9C085848-E882-45A4-9D27-435D8B509D88}" dt="2024-01-19T10:16:36.749" v="328" actId="1076"/>
-        <pc:sldMkLst>
-          <pc:docMk/>
-          <pc:sldMk cId="4161078049" sldId="260"/>
-        </pc:sldMkLst>
-        <pc:spChg chg="mod">
-          <ac:chgData name="Jonathan Melly" userId="a7718738-f2aa-4d1b-bcf4-5a9c900fe107" providerId="ADAL" clId="{9C085848-E882-45A4-9D27-435D8B509D88}" dt="2024-01-12T15:13:26.470" v="316" actId="20577"/>
-          <ac:spMkLst>
-            <pc:docMk/>
-            <pc:sldMk cId="4161078049" sldId="260"/>
-            <ac:spMk id="2" creationId="{691F4783-6859-766F-AC74-FD674BCEB66D}"/>
-          </ac:spMkLst>
-        </pc:spChg>
-        <pc:spChg chg="mod">
-          <ac:chgData name="Jonathan Melly" userId="a7718738-f2aa-4d1b-bcf4-5a9c900fe107" providerId="ADAL" clId="{9C085848-E882-45A4-9D27-435D8B509D88}" dt="2024-01-19T10:16:25.031" v="326" actId="20577"/>
-          <ac:spMkLst>
-            <pc:docMk/>
-            <pc:sldMk cId="4161078049" sldId="260"/>
-            <ac:spMk id="3" creationId="{F8DC1EF1-AF4A-AA67-42A8-2A9F3157B045}"/>
-          </ac:spMkLst>
-        </pc:spChg>
-        <pc:picChg chg="add mod">
-          <ac:chgData name="Jonathan Melly" userId="a7718738-f2aa-4d1b-bcf4-5a9c900fe107" providerId="ADAL" clId="{9C085848-E882-45A4-9D27-435D8B509D88}" dt="2024-01-19T10:16:36.749" v="328" actId="1076"/>
-          <ac:picMkLst>
-            <pc:docMk/>
-            <pc:sldMk cId="4161078049" sldId="260"/>
-            <ac:picMk id="5" creationId="{9486997B-2E80-4E80-D7B0-FD7D12AE5471}"/>
-          </ac:picMkLst>
-        </pc:picChg>
-      </pc:sldChg>
-      <pc:sldChg chg="new del">
-        <pc:chgData name="Jonathan Melly" userId="a7718738-f2aa-4d1b-bcf4-5a9c900fe107" providerId="ADAL" clId="{9C085848-E882-45A4-9D27-435D8B509D88}" dt="2024-01-19T08:51:48.677" v="318" actId="47"/>
-        <pc:sldMkLst>
-          <pc:docMk/>
-          <pc:sldMk cId="4115101391" sldId="261"/>
-        </pc:sldMkLst>
       </pc:sldChg>
     </pc:docChg>
   </pc:docChgLst>
@@ -1001,130 +911,221 @@
     </pc:docChg>
   </pc:docChgLst>
   <pc:docChgLst>
-    <pc:chgData name="Jonathan Melly" userId="a7718738-f2aa-4d1b-bcf4-5a9c900fe107" providerId="ADAL" clId="{1F1688F6-D224-4ACD-9032-0C69C37BD645}"/>
-    <pc:docChg chg="undo custSel addSld modSld">
-      <pc:chgData name="Jonathan Melly" userId="a7718738-f2aa-4d1b-bcf4-5a9c900fe107" providerId="ADAL" clId="{1F1688F6-D224-4ACD-9032-0C69C37BD645}" dt="2024-03-08T13:37:03.781" v="144"/>
+    <pc:chgData name="Jonathan Melly" userId="a7718738-f2aa-4d1b-bcf4-5a9c900fe107" providerId="ADAL" clId="{9C085848-E882-45A4-9D27-435D8B509D88}"/>
+    <pc:docChg chg="custSel addSld delSld modSld">
+      <pc:chgData name="Jonathan Melly" userId="a7718738-f2aa-4d1b-bcf4-5a9c900fe107" providerId="ADAL" clId="{9C085848-E882-45A4-9D27-435D8B509D88}" dt="2024-01-19T10:16:36.749" v="328" actId="1076"/>
       <pc:docMkLst>
         <pc:docMk/>
       </pc:docMkLst>
-      <pc:sldChg chg="addSp delSp modSp new mod modAnim">
-        <pc:chgData name="Jonathan Melly" userId="a7718738-f2aa-4d1b-bcf4-5a9c900fe107" providerId="ADAL" clId="{1F1688F6-D224-4ACD-9032-0C69C37BD645}" dt="2024-03-08T13:37:03.781" v="144"/>
+      <pc:sldChg chg="modSp new mod">
+        <pc:chgData name="Jonathan Melly" userId="a7718738-f2aa-4d1b-bcf4-5a9c900fe107" providerId="ADAL" clId="{9C085848-E882-45A4-9D27-435D8B509D88}" dt="2024-01-12T15:01:02.398" v="25"/>
         <pc:sldMkLst>
           <pc:docMk/>
-          <pc:sldMk cId="1682411159" sldId="264"/>
+          <pc:sldMk cId="2286386300" sldId="256"/>
         </pc:sldMkLst>
         <pc:spChg chg="mod">
-          <ac:chgData name="Jonathan Melly" userId="a7718738-f2aa-4d1b-bcf4-5a9c900fe107" providerId="ADAL" clId="{1F1688F6-D224-4ACD-9032-0C69C37BD645}" dt="2024-03-08T10:38:14.518" v="50" actId="20577"/>
+          <ac:chgData name="Jonathan Melly" userId="a7718738-f2aa-4d1b-bcf4-5a9c900fe107" providerId="ADAL" clId="{9C085848-E882-45A4-9D27-435D8B509D88}" dt="2024-01-12T15:01:02.398" v="25"/>
           <ac:spMkLst>
             <pc:docMk/>
-            <pc:sldMk cId="1682411159" sldId="264"/>
-            <ac:spMk id="2" creationId="{7299DA15-6D43-EFFE-2BB5-B120C7929F15}"/>
+            <pc:sldMk cId="2286386300" sldId="256"/>
+            <ac:spMk id="2" creationId="{FCAD736B-19A3-8E64-E7BD-5957E686660D}"/>
+          </ac:spMkLst>
+        </pc:spChg>
+        <pc:spChg chg="mod">
+          <ac:chgData name="Jonathan Melly" userId="a7718738-f2aa-4d1b-bcf4-5a9c900fe107" providerId="ADAL" clId="{9C085848-E882-45A4-9D27-435D8B509D88}" dt="2024-01-12T15:01:02.398" v="25"/>
+          <ac:spMkLst>
+            <pc:docMk/>
+            <pc:sldMk cId="2286386300" sldId="256"/>
+            <ac:spMk id="3" creationId="{36FB8BB6-37F6-4FBE-4557-C829238518B7}"/>
+          </ac:spMkLst>
+        </pc:spChg>
+      </pc:sldChg>
+      <pc:sldChg chg="addSp delSp modSp new mod modNotesTx">
+        <pc:chgData name="Jonathan Melly" userId="a7718738-f2aa-4d1b-bcf4-5a9c900fe107" providerId="ADAL" clId="{9C085848-E882-45A4-9D27-435D8B509D88}" dt="2024-01-12T15:02:13.885" v="65" actId="20577"/>
+        <pc:sldMkLst>
+          <pc:docMk/>
+          <pc:sldMk cId="1540280923" sldId="257"/>
+        </pc:sldMkLst>
+        <pc:spChg chg="mod">
+          <ac:chgData name="Jonathan Melly" userId="a7718738-f2aa-4d1b-bcf4-5a9c900fe107" providerId="ADAL" clId="{9C085848-E882-45A4-9D27-435D8B509D88}" dt="2024-01-12T15:01:36.447" v="47" actId="20577"/>
+          <ac:spMkLst>
+            <pc:docMk/>
+            <pc:sldMk cId="1540280923" sldId="257"/>
+            <ac:spMk id="2" creationId="{AC7134BA-40D9-94A2-E1E5-7EC483439BE2}"/>
           </ac:spMkLst>
         </pc:spChg>
         <pc:spChg chg="del">
-          <ac:chgData name="Jonathan Melly" userId="a7718738-f2aa-4d1b-bcf4-5a9c900fe107" providerId="ADAL" clId="{1F1688F6-D224-4ACD-9032-0C69C37BD645}" dt="2024-03-08T13:27:55.132" v="55"/>
+          <ac:chgData name="Jonathan Melly" userId="a7718738-f2aa-4d1b-bcf4-5a9c900fe107" providerId="ADAL" clId="{9C085848-E882-45A4-9D27-435D8B509D88}" dt="2024-01-12T15:00:48.107" v="24"/>
           <ac:spMkLst>
             <pc:docMk/>
-            <pc:sldMk cId="1682411159" sldId="264"/>
-            <ac:spMk id="3" creationId="{E0F5172E-EA29-29DD-58E6-C5A8C57374F3}"/>
+            <pc:sldMk cId="1540280923" sldId="257"/>
+            <ac:spMk id="3" creationId="{CB332372-0A8D-1940-788D-FBD05C184558}"/>
+          </ac:spMkLst>
+        </pc:spChg>
+        <pc:picChg chg="add mod">
+          <ac:chgData name="Jonathan Melly" userId="a7718738-f2aa-4d1b-bcf4-5a9c900fe107" providerId="ADAL" clId="{9C085848-E882-45A4-9D27-435D8B509D88}" dt="2024-01-12T15:01:02.398" v="25"/>
+          <ac:picMkLst>
+            <pc:docMk/>
+            <pc:sldMk cId="1540280923" sldId="257"/>
+            <ac:picMk id="1026" creationId="{E634AA88-B0DE-18FD-48DC-ACA8968ED85C}"/>
+          </ac:picMkLst>
+        </pc:picChg>
+      </pc:sldChg>
+      <pc:sldChg chg="addSp delSp modSp new mod">
+        <pc:chgData name="Jonathan Melly" userId="a7718738-f2aa-4d1b-bcf4-5a9c900fe107" providerId="ADAL" clId="{9C085848-E882-45A4-9D27-435D8B509D88}" dt="2024-01-12T15:04:01.749" v="235" actId="20577"/>
+        <pc:sldMkLst>
+          <pc:docMk/>
+          <pc:sldMk cId="1768159204" sldId="258"/>
+        </pc:sldMkLst>
+        <pc:spChg chg="mod">
+          <ac:chgData name="Jonathan Melly" userId="a7718738-f2aa-4d1b-bcf4-5a9c900fe107" providerId="ADAL" clId="{9C085848-E882-45A4-9D27-435D8B509D88}" dt="2024-01-12T15:03:24.030" v="154" actId="20577"/>
+          <ac:spMkLst>
+            <pc:docMk/>
+            <pc:sldMk cId="1768159204" sldId="258"/>
+            <ac:spMk id="2" creationId="{C153CEAF-9A1B-7B25-E72A-95152A00875A}"/>
+          </ac:spMkLst>
+        </pc:spChg>
+        <pc:spChg chg="del">
+          <ac:chgData name="Jonathan Melly" userId="a7718738-f2aa-4d1b-bcf4-5a9c900fe107" providerId="ADAL" clId="{9C085848-E882-45A4-9D27-435D8B509D88}" dt="2024-01-12T15:02:31.265" v="96"/>
+          <ac:spMkLst>
+            <pc:docMk/>
+            <pc:sldMk cId="1768159204" sldId="258"/>
+            <ac:spMk id="3" creationId="{5654FF16-42ED-ABDB-8D78-0518B1F6A0D6}"/>
           </ac:spMkLst>
         </pc:spChg>
         <pc:spChg chg="add mod">
-          <ac:chgData name="Jonathan Melly" userId="a7718738-f2aa-4d1b-bcf4-5a9c900fe107" providerId="ADAL" clId="{1F1688F6-D224-4ACD-9032-0C69C37BD645}" dt="2024-03-08T13:30:16.008" v="75" actId="207"/>
+          <ac:chgData name="Jonathan Melly" userId="a7718738-f2aa-4d1b-bcf4-5a9c900fe107" providerId="ADAL" clId="{9C085848-E882-45A4-9D27-435D8B509D88}" dt="2024-01-12T15:04:01.749" v="235" actId="20577"/>
           <ac:spMkLst>
             <pc:docMk/>
-            <pc:sldMk cId="1682411159" sldId="264"/>
-            <ac:spMk id="12" creationId="{BA188E49-1D75-BE92-6760-D72D8F749B4B}"/>
+            <pc:sldMk cId="1768159204" sldId="258"/>
+            <ac:spMk id="4" creationId="{7D3276C4-FD62-9018-2781-5868F1128E3E}"/>
+          </ac:spMkLst>
+        </pc:spChg>
+        <pc:picChg chg="add mod">
+          <ac:chgData name="Jonathan Melly" userId="a7718738-f2aa-4d1b-bcf4-5a9c900fe107" providerId="ADAL" clId="{9C085848-E882-45A4-9D27-435D8B509D88}" dt="2024-01-12T15:02:40.308" v="102" actId="1076"/>
+          <ac:picMkLst>
+            <pc:docMk/>
+            <pc:sldMk cId="1768159204" sldId="258"/>
+            <ac:picMk id="2050" creationId="{B3E21F42-2F98-749F-EE6F-AA36733F8C02}"/>
+          </ac:picMkLst>
+        </pc:picChg>
+      </pc:sldChg>
+      <pc:sldChg chg="addSp delSp modSp new mod modAnim">
+        <pc:chgData name="Jonathan Melly" userId="a7718738-f2aa-4d1b-bcf4-5a9c900fe107" providerId="ADAL" clId="{9C085848-E882-45A4-9D27-435D8B509D88}" dt="2024-01-12T15:13:12.118" v="308"/>
+        <pc:sldMkLst>
+          <pc:docMk/>
+          <pc:sldMk cId="4088551538" sldId="259"/>
+        </pc:sldMkLst>
+        <pc:spChg chg="mod">
+          <ac:chgData name="Jonathan Melly" userId="a7718738-f2aa-4d1b-bcf4-5a9c900fe107" providerId="ADAL" clId="{9C085848-E882-45A4-9D27-435D8B509D88}" dt="2024-01-12T15:04:14.959" v="242" actId="20577"/>
+          <ac:spMkLst>
+            <pc:docMk/>
+            <pc:sldMk cId="4088551538" sldId="259"/>
+            <ac:spMk id="2" creationId="{43DE7D65-6535-E64A-072D-1919CF5318E2}"/>
+          </ac:spMkLst>
+        </pc:spChg>
+        <pc:spChg chg="del mod">
+          <ac:chgData name="Jonathan Melly" userId="a7718738-f2aa-4d1b-bcf4-5a9c900fe107" providerId="ADAL" clId="{9C085848-E882-45A4-9D27-435D8B509D88}" dt="2024-01-12T15:09:04.984" v="247" actId="478"/>
+          <ac:spMkLst>
+            <pc:docMk/>
+            <pc:sldMk cId="4088551538" sldId="259"/>
+            <ac:spMk id="3" creationId="{3D92B2E7-AF49-8BF3-5640-2C4A52035294}"/>
           </ac:spMkLst>
         </pc:spChg>
         <pc:spChg chg="add mod">
-          <ac:chgData name="Jonathan Melly" userId="a7718738-f2aa-4d1b-bcf4-5a9c900fe107" providerId="ADAL" clId="{1F1688F6-D224-4ACD-9032-0C69C37BD645}" dt="2024-03-08T13:30:44.416" v="80" actId="14100"/>
+          <ac:chgData name="Jonathan Melly" userId="a7718738-f2aa-4d1b-bcf4-5a9c900fe107" providerId="ADAL" clId="{9C085848-E882-45A4-9D27-435D8B509D88}" dt="2024-01-12T15:10:03.570" v="281" actId="14"/>
           <ac:spMkLst>
             <pc:docMk/>
-            <pc:sldMk cId="1682411159" sldId="264"/>
-            <ac:spMk id="13" creationId="{8C58D3C6-D3EC-F340-55C4-94E95411708B}"/>
-          </ac:spMkLst>
-        </pc:spChg>
-        <pc:spChg chg="add mod">
-          <ac:chgData name="Jonathan Melly" userId="a7718738-f2aa-4d1b-bcf4-5a9c900fe107" providerId="ADAL" clId="{1F1688F6-D224-4ACD-9032-0C69C37BD645}" dt="2024-03-08T13:30:48.245" v="82" actId="1076"/>
-          <ac:spMkLst>
-            <pc:docMk/>
-            <pc:sldMk cId="1682411159" sldId="264"/>
-            <ac:spMk id="14" creationId="{17B7CDF6-1887-D41E-7DCA-6C0E6F28342A}"/>
-          </ac:spMkLst>
-        </pc:spChg>
-        <pc:spChg chg="add mod">
-          <ac:chgData name="Jonathan Melly" userId="a7718738-f2aa-4d1b-bcf4-5a9c900fe107" providerId="ADAL" clId="{1F1688F6-D224-4ACD-9032-0C69C37BD645}" dt="2024-03-08T13:34:14.359" v="126" actId="1076"/>
-          <ac:spMkLst>
-            <pc:docMk/>
-            <pc:sldMk cId="1682411159" sldId="264"/>
-            <ac:spMk id="21" creationId="{A2DE6599-8B04-F8F1-0178-13B6DF522AB6}"/>
-          </ac:spMkLst>
-        </pc:spChg>
-        <pc:spChg chg="add mod">
-          <ac:chgData name="Jonathan Melly" userId="a7718738-f2aa-4d1b-bcf4-5a9c900fe107" providerId="ADAL" clId="{1F1688F6-D224-4ACD-9032-0C69C37BD645}" dt="2024-03-08T13:36:57.117" v="143" actId="1076"/>
-          <ac:spMkLst>
-            <pc:docMk/>
-            <pc:sldMk cId="1682411159" sldId="264"/>
-            <ac:spMk id="22" creationId="{C7541621-CD2F-541E-AC60-9BEFC581F957}"/>
+            <pc:sldMk cId="4088551538" sldId="259"/>
+            <ac:spMk id="7" creationId="{1435E9AD-1F66-8917-AE32-DCFEEFD982F4}"/>
           </ac:spMkLst>
         </pc:spChg>
         <pc:picChg chg="add mod">
-          <ac:chgData name="Jonathan Melly" userId="a7718738-f2aa-4d1b-bcf4-5a9c900fe107" providerId="ADAL" clId="{1F1688F6-D224-4ACD-9032-0C69C37BD645}" dt="2024-03-08T13:34:08.479" v="125" actId="1076"/>
+          <ac:chgData name="Jonathan Melly" userId="a7718738-f2aa-4d1b-bcf4-5a9c900fe107" providerId="ADAL" clId="{9C085848-E882-45A4-9D27-435D8B509D88}" dt="2024-01-12T15:09:14.534" v="250" actId="1076"/>
           <ac:picMkLst>
             <pc:docMk/>
-            <pc:sldMk cId="1682411159" sldId="264"/>
-            <ac:picMk id="5" creationId="{219C7D86-CA7E-4C12-3FFE-28B484D4EBA2}"/>
+            <pc:sldMk cId="4088551538" sldId="259"/>
+            <ac:picMk id="5" creationId="{3131A495-75ED-B1CD-C115-BF8DC7D9ACD2}"/>
           </ac:picMkLst>
         </pc:picChg>
-        <pc:picChg chg="add mod">
-          <ac:chgData name="Jonathan Melly" userId="a7718738-f2aa-4d1b-bcf4-5a9c900fe107" providerId="ADAL" clId="{1F1688F6-D224-4ACD-9032-0C69C37BD645}" dt="2024-03-08T13:29:30.213" v="71" actId="1076"/>
-          <ac:picMkLst>
-            <pc:docMk/>
-            <pc:sldMk cId="1682411159" sldId="264"/>
-            <ac:picMk id="7" creationId="{6333F413-DE31-3137-4C06-93D9A6D777CA}"/>
-          </ac:picMkLst>
-        </pc:picChg>
-        <pc:picChg chg="add del mod">
-          <ac:chgData name="Jonathan Melly" userId="a7718738-f2aa-4d1b-bcf4-5a9c900fe107" providerId="ADAL" clId="{1F1688F6-D224-4ACD-9032-0C69C37BD645}" dt="2024-03-08T13:28:55.629" v="60" actId="478"/>
-          <ac:picMkLst>
-            <pc:docMk/>
-            <pc:sldMk cId="1682411159" sldId="264"/>
-            <ac:picMk id="9" creationId="{788B08FC-ACE0-6159-A9F3-093E21DF53DF}"/>
-          </ac:picMkLst>
-        </pc:picChg>
-        <pc:picChg chg="add mod">
-          <ac:chgData name="Jonathan Melly" userId="a7718738-f2aa-4d1b-bcf4-5a9c900fe107" providerId="ADAL" clId="{1F1688F6-D224-4ACD-9032-0C69C37BD645}" dt="2024-03-08T13:29:33.785" v="72" actId="1076"/>
-          <ac:picMkLst>
-            <pc:docMk/>
-            <pc:sldMk cId="1682411159" sldId="264"/>
-            <ac:picMk id="11" creationId="{BE5278CE-97E0-68DD-BFD0-45DD96675387}"/>
-          </ac:picMkLst>
-        </pc:picChg>
-        <pc:picChg chg="add mod">
-          <ac:chgData name="Jonathan Melly" userId="a7718738-f2aa-4d1b-bcf4-5a9c900fe107" providerId="ADAL" clId="{1F1688F6-D224-4ACD-9032-0C69C37BD645}" dt="2024-03-08T13:34:37.985" v="130" actId="1440"/>
-          <ac:picMkLst>
-            <pc:docMk/>
-            <pc:sldMk cId="1682411159" sldId="264"/>
-            <ac:picMk id="18" creationId="{7E6A3F0F-D63C-4126-41CF-DB9F4BBFA66B}"/>
-          </ac:picMkLst>
-        </pc:picChg>
-        <pc:cxnChg chg="add mod">
-          <ac:chgData name="Jonathan Melly" userId="a7718738-f2aa-4d1b-bcf4-5a9c900fe107" providerId="ADAL" clId="{1F1688F6-D224-4ACD-9032-0C69C37BD645}" dt="2024-03-08T13:31:01.801" v="84" actId="1582"/>
+        <pc:cxnChg chg="add">
+          <ac:chgData name="Jonathan Melly" userId="a7718738-f2aa-4d1b-bcf4-5a9c900fe107" providerId="ADAL" clId="{9C085848-E882-45A4-9D27-435D8B509D88}" dt="2024-01-12T15:11:10.798" v="285" actId="11529"/>
           <ac:cxnSpMkLst>
             <pc:docMk/>
-            <pc:sldMk cId="1682411159" sldId="264"/>
-            <ac:cxnSpMk id="16" creationId="{CF6B2D61-35F4-E9B2-AC89-6F390A0753D1}"/>
+            <pc:sldMk cId="4088551538" sldId="259"/>
+            <ac:cxnSpMk id="9" creationId="{178A1D86-DC4E-C5BE-B2EB-C7E3F0A3E2E3}"/>
           </ac:cxnSpMkLst>
         </pc:cxnChg>
         <pc:cxnChg chg="add mod">
-          <ac:chgData name="Jonathan Melly" userId="a7718738-f2aa-4d1b-bcf4-5a9c900fe107" providerId="ADAL" clId="{1F1688F6-D224-4ACD-9032-0C69C37BD645}" dt="2024-03-08T13:33:29.405" v="101" actId="14100"/>
+          <ac:chgData name="Jonathan Melly" userId="a7718738-f2aa-4d1b-bcf4-5a9c900fe107" providerId="ADAL" clId="{9C085848-E882-45A4-9D27-435D8B509D88}" dt="2024-01-12T15:11:18.261" v="288" actId="14100"/>
           <ac:cxnSpMkLst>
             <pc:docMk/>
-            <pc:sldMk cId="1682411159" sldId="264"/>
-            <ac:cxnSpMk id="19" creationId="{0EF3B47A-5D15-DE5C-4CE7-901594F4A978}"/>
+            <pc:sldMk cId="4088551538" sldId="259"/>
+            <ac:cxnSpMk id="10" creationId="{8F9C5BCE-FB46-70CF-A26D-325F56A0424B}"/>
           </ac:cxnSpMkLst>
         </pc:cxnChg>
+        <pc:cxnChg chg="add mod">
+          <ac:chgData name="Jonathan Melly" userId="a7718738-f2aa-4d1b-bcf4-5a9c900fe107" providerId="ADAL" clId="{9C085848-E882-45A4-9D27-435D8B509D88}" dt="2024-01-12T15:11:55.085" v="293" actId="13822"/>
+          <ac:cxnSpMkLst>
+            <pc:docMk/>
+            <pc:sldMk cId="4088551538" sldId="259"/>
+            <ac:cxnSpMk id="14" creationId="{92159152-3395-530D-3A65-18E4902D99AE}"/>
+          </ac:cxnSpMkLst>
+        </pc:cxnChg>
+        <pc:cxnChg chg="add mod">
+          <ac:chgData name="Jonathan Melly" userId="a7718738-f2aa-4d1b-bcf4-5a9c900fe107" providerId="ADAL" clId="{9C085848-E882-45A4-9D27-435D8B509D88}" dt="2024-01-12T15:12:01.310" v="296" actId="14100"/>
+          <ac:cxnSpMkLst>
+            <pc:docMk/>
+            <pc:sldMk cId="4088551538" sldId="259"/>
+            <ac:cxnSpMk id="15" creationId="{4E07FE43-38F6-A45D-7248-BE8E78E68624}"/>
+          </ac:cxnSpMkLst>
+        </pc:cxnChg>
+        <pc:cxnChg chg="add mod">
+          <ac:chgData name="Jonathan Melly" userId="a7718738-f2aa-4d1b-bcf4-5a9c900fe107" providerId="ADAL" clId="{9C085848-E882-45A4-9D27-435D8B509D88}" dt="2024-01-12T15:12:59.872" v="305" actId="13822"/>
+          <ac:cxnSpMkLst>
+            <pc:docMk/>
+            <pc:sldMk cId="4088551538" sldId="259"/>
+            <ac:cxnSpMk id="19" creationId="{1BBE4CE4-F0BD-ED13-2D33-498066D38D16}"/>
+          </ac:cxnSpMkLst>
+        </pc:cxnChg>
+      </pc:sldChg>
+      <pc:sldChg chg="addSp modSp new mod">
+        <pc:chgData name="Jonathan Melly" userId="a7718738-f2aa-4d1b-bcf4-5a9c900fe107" providerId="ADAL" clId="{9C085848-E882-45A4-9D27-435D8B509D88}" dt="2024-01-19T10:16:36.749" v="328" actId="1076"/>
+        <pc:sldMkLst>
+          <pc:docMk/>
+          <pc:sldMk cId="4161078049" sldId="260"/>
+        </pc:sldMkLst>
+        <pc:spChg chg="mod">
+          <ac:chgData name="Jonathan Melly" userId="a7718738-f2aa-4d1b-bcf4-5a9c900fe107" providerId="ADAL" clId="{9C085848-E882-45A4-9D27-435D8B509D88}" dt="2024-01-12T15:13:26.470" v="316" actId="20577"/>
+          <ac:spMkLst>
+            <pc:docMk/>
+            <pc:sldMk cId="4161078049" sldId="260"/>
+            <ac:spMk id="2" creationId="{691F4783-6859-766F-AC74-FD674BCEB66D}"/>
+          </ac:spMkLst>
+        </pc:spChg>
+        <pc:spChg chg="mod">
+          <ac:chgData name="Jonathan Melly" userId="a7718738-f2aa-4d1b-bcf4-5a9c900fe107" providerId="ADAL" clId="{9C085848-E882-45A4-9D27-435D8B509D88}" dt="2024-01-19T10:16:25.031" v="326" actId="20577"/>
+          <ac:spMkLst>
+            <pc:docMk/>
+            <pc:sldMk cId="4161078049" sldId="260"/>
+            <ac:spMk id="3" creationId="{F8DC1EF1-AF4A-AA67-42A8-2A9F3157B045}"/>
+          </ac:spMkLst>
+        </pc:spChg>
+        <pc:picChg chg="add mod">
+          <ac:chgData name="Jonathan Melly" userId="a7718738-f2aa-4d1b-bcf4-5a9c900fe107" providerId="ADAL" clId="{9C085848-E882-45A4-9D27-435D8B509D88}" dt="2024-01-19T10:16:36.749" v="328" actId="1076"/>
+          <ac:picMkLst>
+            <pc:docMk/>
+            <pc:sldMk cId="4161078049" sldId="260"/>
+            <ac:picMk id="5" creationId="{9486997B-2E80-4E80-D7B0-FD7D12AE5471}"/>
+          </ac:picMkLst>
+        </pc:picChg>
+      </pc:sldChg>
+      <pc:sldChg chg="new del">
+        <pc:chgData name="Jonathan Melly" userId="a7718738-f2aa-4d1b-bcf4-5a9c900fe107" providerId="ADAL" clId="{9C085848-E882-45A4-9D27-435D8B509D88}" dt="2024-01-19T08:51:48.677" v="318" actId="47"/>
+        <pc:sldMkLst>
+          <pc:docMk/>
+          <pc:sldMk cId="4115101391" sldId="261"/>
+        </pc:sldMkLst>
       </pc:sldChg>
     </pc:docChg>
   </pc:docChgLst>
@@ -1213,7 +1214,7 @@
           <a:p>
             <a:fld id="{5CE4D524-415F-4527-905A-26B13F2E9D64}" type="datetimeFigureOut">
               <a:rPr lang="fr-CH" smtClean="0"/>
-              <a:t>08.03.2024</a:t>
+              <a:t>28.12.2025</a:t>
             </a:fld>
             <a:endParaRPr lang="fr-CH"/>
           </a:p>
@@ -1732,6 +1733,13 @@
               <a:schemeClr val="lt1"/>
             </a:fontRef>
           </p:style>
+          <p:txBody>
+            <a:bodyPr/>
+            <a:lstStyle/>
+            <a:p>
+              <a:endParaRPr lang="fr-CH"/>
+            </a:p>
+          </p:txBody>
         </p:sp>
         <p:sp>
           <p:nvSpPr>
@@ -1795,6 +1803,13 @@
               <a:schemeClr val="lt1"/>
             </a:fontRef>
           </p:style>
+          <p:txBody>
+            <a:bodyPr/>
+            <a:lstStyle/>
+            <a:p>
+              <a:endParaRPr lang="fr-CH"/>
+            </a:p>
+          </p:txBody>
         </p:sp>
         <p:sp>
           <p:nvSpPr>
@@ -1836,6 +1851,13 @@
               <a:schemeClr val="lt1"/>
             </a:fontRef>
           </p:style>
+          <p:txBody>
+            <a:bodyPr/>
+            <a:lstStyle/>
+            <a:p>
+              <a:endParaRPr lang="fr-CH"/>
+            </a:p>
+          </p:txBody>
         </p:sp>
         <p:sp>
           <p:nvSpPr>
@@ -1900,6 +1922,13 @@
               <a:schemeClr val="lt1"/>
             </a:fontRef>
           </p:style>
+          <p:txBody>
+            <a:bodyPr/>
+            <a:lstStyle/>
+            <a:p>
+              <a:endParaRPr lang="fr-CH"/>
+            </a:p>
+          </p:txBody>
         </p:sp>
         <p:sp>
           <p:nvSpPr>
@@ -1965,6 +1994,13 @@
               <a:schemeClr val="lt1"/>
             </a:fontRef>
           </p:style>
+          <p:txBody>
+            <a:bodyPr/>
+            <a:lstStyle/>
+            <a:p>
+              <a:endParaRPr lang="fr-CH"/>
+            </a:p>
+          </p:txBody>
         </p:sp>
         <p:sp>
           <p:nvSpPr>
@@ -2028,6 +2064,13 @@
               <a:schemeClr val="lt1"/>
             </a:fontRef>
           </p:style>
+          <p:txBody>
+            <a:bodyPr/>
+            <a:lstStyle/>
+            <a:p>
+              <a:endParaRPr lang="fr-CH"/>
+            </a:p>
+          </p:txBody>
         </p:sp>
         <p:sp>
           <p:nvSpPr>
@@ -2069,6 +2112,13 @@
               <a:schemeClr val="lt1"/>
             </a:fontRef>
           </p:style>
+          <p:txBody>
+            <a:bodyPr/>
+            <a:lstStyle/>
+            <a:p>
+              <a:endParaRPr lang="fr-CH"/>
+            </a:p>
+          </p:txBody>
         </p:sp>
         <p:sp>
           <p:nvSpPr>
@@ -2110,6 +2160,13 @@
               <a:schemeClr val="lt1"/>
             </a:fontRef>
           </p:style>
+          <p:txBody>
+            <a:bodyPr/>
+            <a:lstStyle/>
+            <a:p>
+              <a:endParaRPr lang="fr-CH"/>
+            </a:p>
+          </p:txBody>
         </p:sp>
       </p:grpSp>
       <p:sp>
@@ -2287,7 +2344,7 @@
           <a:p>
             <a:fld id="{E5A2B3CD-5BE9-499F-BFC9-86E4D056EB72}" type="datetimeFigureOut">
               <a:rPr lang="fr-CH" smtClean="0"/>
-              <a:t>08.03.2024</a:t>
+              <a:t>28.12.2025</a:t>
             </a:fld>
             <a:endParaRPr lang="fr-CH"/>
           </a:p>
@@ -2538,7 +2595,7 @@
           <a:p>
             <a:fld id="{E5A2B3CD-5BE9-499F-BFC9-86E4D056EB72}" type="datetimeFigureOut">
               <a:rPr lang="fr-CH" smtClean="0"/>
-              <a:t>08.03.2024</a:t>
+              <a:t>28.12.2025</a:t>
             </a:fld>
             <a:endParaRPr lang="fr-CH"/>
           </a:p>
@@ -2852,7 +2909,7 @@
           <a:p>
             <a:fld id="{E5A2B3CD-5BE9-499F-BFC9-86E4D056EB72}" type="datetimeFigureOut">
               <a:rPr lang="fr-CH" smtClean="0"/>
-              <a:t>08.03.2024</a:t>
+              <a:t>28.12.2025</a:t>
             </a:fld>
             <a:endParaRPr lang="fr-CH"/>
           </a:p>
@@ -3193,7 +3250,7 @@
           <a:p>
             <a:fld id="{E5A2B3CD-5BE9-499F-BFC9-86E4D056EB72}" type="datetimeFigureOut">
               <a:rPr lang="fr-CH" smtClean="0"/>
-              <a:t>08.03.2024</a:t>
+              <a:t>28.12.2025</a:t>
             </a:fld>
             <a:endParaRPr lang="fr-CH"/>
           </a:p>
@@ -3507,7 +3564,7 @@
           <a:p>
             <a:fld id="{E5A2B3CD-5BE9-499F-BFC9-86E4D056EB72}" type="datetimeFigureOut">
               <a:rPr lang="fr-CH" smtClean="0"/>
-              <a:t>08.03.2024</a:t>
+              <a:t>28.12.2025</a:t>
             </a:fld>
             <a:endParaRPr lang="fr-CH"/>
           </a:p>
@@ -3900,7 +3957,7 @@
           <a:p>
             <a:fld id="{E5A2B3CD-5BE9-499F-BFC9-86E4D056EB72}" type="datetimeFigureOut">
               <a:rPr lang="fr-CH" smtClean="0"/>
-              <a:t>08.03.2024</a:t>
+              <a:t>28.12.2025</a:t>
             </a:fld>
             <a:endParaRPr lang="fr-CH"/>
           </a:p>
@@ -4070,7 +4127,7 @@
           <a:p>
             <a:fld id="{E5A2B3CD-5BE9-499F-BFC9-86E4D056EB72}" type="datetimeFigureOut">
               <a:rPr lang="fr-CH" smtClean="0"/>
-              <a:t>08.03.2024</a:t>
+              <a:t>28.12.2025</a:t>
             </a:fld>
             <a:endParaRPr lang="fr-CH"/>
           </a:p>
@@ -4250,7 +4307,7 @@
           <a:p>
             <a:fld id="{E5A2B3CD-5BE9-499F-BFC9-86E4D056EB72}" type="datetimeFigureOut">
               <a:rPr lang="fr-CH" smtClean="0"/>
-              <a:t>08.03.2024</a:t>
+              <a:t>28.12.2025</a:t>
             </a:fld>
             <a:endParaRPr lang="fr-CH"/>
           </a:p>
@@ -4426,7 +4483,7 @@
           <a:p>
             <a:fld id="{E5A2B3CD-5BE9-499F-BFC9-86E4D056EB72}" type="datetimeFigureOut">
               <a:rPr lang="fr-CH" smtClean="0"/>
-              <a:t>08.03.2024</a:t>
+              <a:t>28.12.2025</a:t>
             </a:fld>
             <a:endParaRPr lang="fr-CH"/>
           </a:p>
@@ -4673,7 +4730,7 @@
           <a:p>
             <a:fld id="{E5A2B3CD-5BE9-499F-BFC9-86E4D056EB72}" type="datetimeFigureOut">
               <a:rPr lang="fr-CH" smtClean="0"/>
-              <a:t>08.03.2024</a:t>
+              <a:t>28.12.2025</a:t>
             </a:fld>
             <a:endParaRPr lang="fr-CH"/>
           </a:p>
@@ -4905,7 +4962,7 @@
           <a:p>
             <a:fld id="{E5A2B3CD-5BE9-499F-BFC9-86E4D056EB72}" type="datetimeFigureOut">
               <a:rPr lang="fr-CH" smtClean="0"/>
-              <a:t>08.03.2024</a:t>
+              <a:t>28.12.2025</a:t>
             </a:fld>
             <a:endParaRPr lang="fr-CH"/>
           </a:p>
@@ -5279,7 +5336,7 @@
           <a:p>
             <a:fld id="{E5A2B3CD-5BE9-499F-BFC9-86E4D056EB72}" type="datetimeFigureOut">
               <a:rPr lang="fr-CH" smtClean="0"/>
-              <a:t>08.03.2024</a:t>
+              <a:t>28.12.2025</a:t>
             </a:fld>
             <a:endParaRPr lang="fr-CH"/>
           </a:p>
@@ -5402,7 +5459,7 @@
           <a:p>
             <a:fld id="{E5A2B3CD-5BE9-499F-BFC9-86E4D056EB72}" type="datetimeFigureOut">
               <a:rPr lang="fr-CH" smtClean="0"/>
-              <a:t>08.03.2024</a:t>
+              <a:t>28.12.2025</a:t>
             </a:fld>
             <a:endParaRPr lang="fr-CH"/>
           </a:p>
@@ -5497,7 +5554,7 @@
           <a:p>
             <a:fld id="{E5A2B3CD-5BE9-499F-BFC9-86E4D056EB72}" type="datetimeFigureOut">
               <a:rPr lang="fr-CH" smtClean="0"/>
-              <a:t>08.03.2024</a:t>
+              <a:t>28.12.2025</a:t>
             </a:fld>
             <a:endParaRPr lang="fr-CH"/>
           </a:p>
@@ -5752,7 +5809,7 @@
           <a:p>
             <a:fld id="{E5A2B3CD-5BE9-499F-BFC9-86E4D056EB72}" type="datetimeFigureOut">
               <a:rPr lang="fr-CH" smtClean="0"/>
-              <a:t>08.03.2024</a:t>
+              <a:t>28.12.2025</a:t>
             </a:fld>
             <a:endParaRPr lang="fr-CH"/>
           </a:p>
@@ -6015,7 +6072,7 @@
           <a:p>
             <a:fld id="{E5A2B3CD-5BE9-499F-BFC9-86E4D056EB72}" type="datetimeFigureOut">
               <a:rPr lang="fr-CH" smtClean="0"/>
-              <a:t>08.03.2024</a:t>
+              <a:t>28.12.2025</a:t>
             </a:fld>
             <a:endParaRPr lang="fr-CH"/>
           </a:p>
@@ -6248,6 +6305,13 @@
               <a:schemeClr val="lt1"/>
             </a:fontRef>
           </p:style>
+          <p:txBody>
+            <a:bodyPr/>
+            <a:lstStyle/>
+            <a:p>
+              <a:endParaRPr lang="fr-CH"/>
+            </a:p>
+          </p:txBody>
         </p:sp>
         <p:sp>
           <p:nvSpPr>
@@ -6311,6 +6375,13 @@
               <a:schemeClr val="lt1"/>
             </a:fontRef>
           </p:style>
+          <p:txBody>
+            <a:bodyPr/>
+            <a:lstStyle/>
+            <a:p>
+              <a:endParaRPr lang="fr-CH"/>
+            </a:p>
+          </p:txBody>
         </p:sp>
         <p:sp>
           <p:nvSpPr>
@@ -6352,6 +6423,13 @@
               <a:schemeClr val="lt1"/>
             </a:fontRef>
           </p:style>
+          <p:txBody>
+            <a:bodyPr/>
+            <a:lstStyle/>
+            <a:p>
+              <a:endParaRPr lang="fr-CH"/>
+            </a:p>
+          </p:txBody>
         </p:sp>
         <p:sp>
           <p:nvSpPr>
@@ -6416,6 +6494,13 @@
               <a:schemeClr val="lt1"/>
             </a:fontRef>
           </p:style>
+          <p:txBody>
+            <a:bodyPr/>
+            <a:lstStyle/>
+            <a:p>
+              <a:endParaRPr lang="fr-CH"/>
+            </a:p>
+          </p:txBody>
         </p:sp>
         <p:sp>
           <p:nvSpPr>
@@ -6481,6 +6566,13 @@
               <a:schemeClr val="lt1"/>
             </a:fontRef>
           </p:style>
+          <p:txBody>
+            <a:bodyPr/>
+            <a:lstStyle/>
+            <a:p>
+              <a:endParaRPr lang="fr-CH"/>
+            </a:p>
+          </p:txBody>
         </p:sp>
         <p:sp>
           <p:nvSpPr>
@@ -6544,6 +6636,13 @@
               <a:schemeClr val="lt1"/>
             </a:fontRef>
           </p:style>
+          <p:txBody>
+            <a:bodyPr/>
+            <a:lstStyle/>
+            <a:p>
+              <a:endParaRPr lang="fr-CH"/>
+            </a:p>
+          </p:txBody>
         </p:sp>
         <p:sp>
           <p:nvSpPr>
@@ -6585,6 +6684,13 @@
               <a:schemeClr val="lt1"/>
             </a:fontRef>
           </p:style>
+          <p:txBody>
+            <a:bodyPr/>
+            <a:lstStyle/>
+            <a:p>
+              <a:endParaRPr lang="fr-CH"/>
+            </a:p>
+          </p:txBody>
         </p:sp>
         <p:sp>
           <p:nvSpPr>
@@ -6626,6 +6732,13 @@
               <a:schemeClr val="lt1"/>
             </a:fontRef>
           </p:style>
+          <p:txBody>
+            <a:bodyPr/>
+            <a:lstStyle/>
+            <a:p>
+              <a:endParaRPr lang="fr-CH"/>
+            </a:p>
+          </p:txBody>
         </p:sp>
       </p:grpSp>
       <p:sp>
@@ -6758,7 +6871,7 @@
           <a:p>
             <a:fld id="{E5A2B3CD-5BE9-499F-BFC9-86E4D056EB72}" type="datetimeFigureOut">
               <a:rPr lang="fr-CH" smtClean="0"/>
-              <a:t>08.03.2024</a:t>
+              <a:t>28.12.2025</a:t>
             </a:fld>
             <a:endParaRPr lang="fr-CH"/>
           </a:p>
@@ -8902,6 +9015,31 @@
               <a:t>Pile de navigation</a:t>
             </a:r>
           </a:p>
+          <a:p>
+            <a:pPr marL="0" indent="0">
+              <a:buNone/>
+            </a:pPr>
+            <a:r>
+              <a:rPr lang="fr-CH" dirty="0"/>
+              <a:t>(</a:t>
+            </a:r>
+            <a:r>
+              <a:rPr lang="fr-CH" dirty="0" err="1"/>
+              <a:t>shell</a:t>
+            </a:r>
+            <a:r>
+              <a:rPr lang="fr-CH" dirty="0"/>
+              <a:t> ou non </a:t>
+            </a:r>
+            <a:r>
+              <a:rPr lang="fr-CH" dirty="0" err="1"/>
+              <a:t>shell</a:t>
+            </a:r>
+            <a:r>
+              <a:rPr lang="fr-CH" dirty="0"/>
+              <a:t>)</a:t>
+            </a:r>
+          </a:p>
         </p:txBody>
       </p:sp>
       <p:pic>
@@ -9015,21 +9153,70 @@
                             </p:childTnLst>
                           </p:cTn>
                         </p:par>
+                      </p:childTnLst>
+                    </p:cTn>
+                  </p:par>
+                  <p:par>
+                    <p:cTn id="7" fill="hold">
+                      <p:stCondLst>
+                        <p:cond delay="indefinite"/>
+                      </p:stCondLst>
+                      <p:childTnLst>
                         <p:par>
-                          <p:cTn id="7" fill="hold">
+                          <p:cTn id="8" fill="hold">
                             <p:stCondLst>
                               <p:cond delay="0"/>
                             </p:stCondLst>
                             <p:childTnLst>
                               <p:par>
-                                <p:cTn id="8" presetID="1" presetClass="entr" presetSubtype="0" fill="hold" nodeType="afterEffect">
+                                <p:cTn id="9" presetID="1" presetClass="entr" presetSubtype="0" fill="hold" grpId="0" nodeType="clickEffect">
                                   <p:stCondLst>
                                     <p:cond delay="0"/>
                                   </p:stCondLst>
                                   <p:childTnLst>
                                     <p:set>
                                       <p:cBhvr>
-                                        <p:cTn id="9" dur="1" fill="hold">
+                                        <p:cTn id="10" dur="1" fill="hold">
+                                          <p:stCondLst>
+                                            <p:cond delay="0"/>
+                                          </p:stCondLst>
+                                        </p:cTn>
+                                        <p:tgtEl>
+                                          <p:spTgt spid="3">
+                                            <p:txEl>
+                                              <p:pRg st="1" end="1"/>
+                                            </p:txEl>
+                                          </p:spTgt>
+                                        </p:tgtEl>
+                                        <p:attrNameLst>
+                                          <p:attrName>style.visibility</p:attrName>
+                                        </p:attrNameLst>
+                                      </p:cBhvr>
+                                      <p:to>
+                                        <p:strVal val="visible"/>
+                                      </p:to>
+                                    </p:set>
+                                  </p:childTnLst>
+                                </p:cTn>
+                              </p:par>
+                            </p:childTnLst>
+                          </p:cTn>
+                        </p:par>
+                        <p:par>
+                          <p:cTn id="11" fill="hold">
+                            <p:stCondLst>
+                              <p:cond delay="0"/>
+                            </p:stCondLst>
+                            <p:childTnLst>
+                              <p:par>
+                                <p:cTn id="12" presetID="1" presetClass="entr" presetSubtype="0" fill="hold" nodeType="afterEffect">
+                                  <p:stCondLst>
+                                    <p:cond delay="0"/>
+                                  </p:stCondLst>
+                                  <p:childTnLst>
+                                    <p:set>
+                                      <p:cBhvr>
+                                        <p:cTn id="13" dur="1" fill="hold">
                                           <p:stCondLst>
                                             <p:cond delay="0"/>
                                           </p:stCondLst>
@@ -9852,6 +10039,673 @@
           <p:cNvPr id="2" name="Titre 1">
             <a:extLst>
               <a:ext uri="{FF2B5EF4-FFF2-40B4-BE49-F238E27FC236}">
+                <a16:creationId xmlns:a16="http://schemas.microsoft.com/office/drawing/2014/main" id="{143D20C0-2BCB-F87C-B1BF-C50BEB354CA2}"/>
+              </a:ext>
+            </a:extLst>
+          </p:cNvPr>
+          <p:cNvSpPr>
+            <a:spLocks noGrp="1"/>
+          </p:cNvSpPr>
+          <p:nvPr>
+            <p:ph type="title"/>
+          </p:nvPr>
+        </p:nvSpPr>
+        <p:spPr/>
+        <p:txBody>
+          <a:bodyPr/>
+          <a:lstStyle/>
+          <a:p>
+            <a:r>
+              <a:rPr lang="fr-CH" dirty="0"/>
+              <a:t>Chemins possibles (</a:t>
+            </a:r>
+            <a:r>
+              <a:rPr lang="fr-CH" dirty="0" err="1"/>
+              <a:t>shell</a:t>
+            </a:r>
+            <a:r>
+              <a:rPr lang="fr-CH" dirty="0"/>
+              <a:t>)</a:t>
+            </a:r>
+          </a:p>
+        </p:txBody>
+      </p:sp>
+      <p:sp>
+        <p:nvSpPr>
+          <p:cNvPr id="3" name="Espace réservé du contenu 2">
+            <a:extLst>
+              <a:ext uri="{FF2B5EF4-FFF2-40B4-BE49-F238E27FC236}">
+                <a16:creationId xmlns:a16="http://schemas.microsoft.com/office/drawing/2014/main" id="{BD4B2B6E-8EE4-E84D-E62E-C1A26E45A646}"/>
+              </a:ext>
+            </a:extLst>
+          </p:cNvPr>
+          <p:cNvSpPr>
+            <a:spLocks noGrp="1"/>
+          </p:cNvSpPr>
+          <p:nvPr>
+            <p:ph idx="1"/>
+          </p:nvPr>
+        </p:nvSpPr>
+        <p:spPr>
+          <a:xfrm>
+            <a:off x="677333" y="1875693"/>
+            <a:ext cx="8912143" cy="4165670"/>
+          </a:xfrm>
+        </p:spPr>
+        <p:txBody>
+          <a:bodyPr>
+            <a:normAutofit fontScale="92500" lnSpcReduction="10000"/>
+          </a:bodyPr>
+          <a:lstStyle/>
+          <a:p>
+            <a:r>
+              <a:rPr lang="fr-CH" dirty="0"/>
+              <a:t>// Navigation relative (ajoute au stack)</a:t>
+            </a:r>
+          </a:p>
+          <a:p>
+            <a:pPr marL="0" indent="0">
+              <a:buNone/>
+            </a:pPr>
+            <a:r>
+              <a:rPr lang="fr-CH" dirty="0" err="1"/>
+              <a:t>await</a:t>
+            </a:r>
+            <a:r>
+              <a:rPr lang="fr-CH" dirty="0"/>
+              <a:t> </a:t>
+            </a:r>
+            <a:r>
+              <a:rPr lang="fr-CH" dirty="0" err="1"/>
+              <a:t>Shell.Current.GoToAsync</a:t>
+            </a:r>
+            <a:r>
+              <a:rPr lang="fr-CH" dirty="0"/>
+              <a:t>("</a:t>
+            </a:r>
+            <a:r>
+              <a:rPr lang="fr-CH" dirty="0" err="1"/>
+              <a:t>detailpage</a:t>
+            </a:r>
+            <a:r>
+              <a:rPr lang="fr-CH" dirty="0"/>
+              <a:t>");</a:t>
+            </a:r>
+          </a:p>
+          <a:p>
+            <a:endParaRPr lang="fr-CH" dirty="0"/>
+          </a:p>
+          <a:p>
+            <a:r>
+              <a:rPr lang="fr-CH" dirty="0"/>
+              <a:t>// Remonte d'un niveau</a:t>
+            </a:r>
+          </a:p>
+          <a:p>
+            <a:pPr marL="0" indent="0">
+              <a:buNone/>
+            </a:pPr>
+            <a:r>
+              <a:rPr lang="fr-CH" dirty="0" err="1"/>
+              <a:t>await</a:t>
+            </a:r>
+            <a:r>
+              <a:rPr lang="fr-CH" dirty="0"/>
+              <a:t> </a:t>
+            </a:r>
+            <a:r>
+              <a:rPr lang="fr-CH" dirty="0" err="1"/>
+              <a:t>Shell.Current.GoToAsync</a:t>
+            </a:r>
+            <a:r>
+              <a:rPr lang="fr-CH" dirty="0"/>
+              <a:t>("../");</a:t>
+            </a:r>
+          </a:p>
+          <a:p>
+            <a:endParaRPr lang="fr-CH" dirty="0"/>
+          </a:p>
+          <a:p>
+            <a:r>
+              <a:rPr lang="fr-CH" dirty="0"/>
+              <a:t>// Remonte puis va à une route au même niveau</a:t>
+            </a:r>
+          </a:p>
+          <a:p>
+            <a:pPr marL="0" indent="0">
+              <a:buNone/>
+            </a:pPr>
+            <a:r>
+              <a:rPr lang="fr-CH" dirty="0" err="1"/>
+              <a:t>await</a:t>
+            </a:r>
+            <a:r>
+              <a:rPr lang="fr-CH" dirty="0"/>
+              <a:t> </a:t>
+            </a:r>
+            <a:r>
+              <a:rPr lang="fr-CH" dirty="0" err="1"/>
+              <a:t>Shell.Current.GoToAsync</a:t>
+            </a:r>
+            <a:r>
+              <a:rPr lang="fr-CH" dirty="0"/>
+              <a:t>("../</a:t>
+            </a:r>
+            <a:r>
+              <a:rPr lang="fr-CH" dirty="0" err="1"/>
+              <a:t>sisterpage</a:t>
+            </a:r>
+            <a:r>
+              <a:rPr lang="fr-CH" dirty="0"/>
+              <a:t>");</a:t>
+            </a:r>
+          </a:p>
+          <a:p>
+            <a:endParaRPr lang="fr-CH" dirty="0"/>
+          </a:p>
+          <a:p>
+            <a:r>
+              <a:rPr lang="fr-CH" dirty="0"/>
+              <a:t>// Navigation absolue (efface le stack)</a:t>
+            </a:r>
+          </a:p>
+          <a:p>
+            <a:pPr marL="0" indent="0">
+              <a:buNone/>
+            </a:pPr>
+            <a:r>
+              <a:rPr lang="fr-CH" dirty="0" err="1"/>
+              <a:t>await</a:t>
+            </a:r>
+            <a:r>
+              <a:rPr lang="fr-CH" dirty="0"/>
+              <a:t> </a:t>
+            </a:r>
+            <a:r>
+              <a:rPr lang="fr-CH" dirty="0" err="1"/>
+              <a:t>Shell.Current.GoToAsync</a:t>
+            </a:r>
+            <a:r>
+              <a:rPr lang="fr-CH" dirty="0"/>
+              <a:t>("//</a:t>
+            </a:r>
+            <a:r>
+              <a:rPr lang="fr-CH" dirty="0" err="1"/>
+              <a:t>homepage</a:t>
+            </a:r>
+            <a:r>
+              <a:rPr lang="fr-CH" dirty="0"/>
+              <a:t>");</a:t>
+            </a:r>
+          </a:p>
+          <a:p>
+            <a:pPr marL="0" indent="0">
+              <a:buNone/>
+            </a:pPr>
+            <a:endParaRPr lang="fr-CH" dirty="0"/>
+          </a:p>
+        </p:txBody>
+      </p:sp>
+    </p:spTree>
+    <p:extLst>
+      <p:ext uri="{BB962C8B-B14F-4D97-AF65-F5344CB8AC3E}">
+        <p14:creationId xmlns:p14="http://schemas.microsoft.com/office/powerpoint/2010/main" val="2099158513"/>
+      </p:ext>
+    </p:extLst>
+  </p:cSld>
+  <p:clrMapOvr>
+    <a:masterClrMapping/>
+  </p:clrMapOvr>
+  <p:timing>
+    <p:tnLst>
+      <p:par>
+        <p:cTn id="1" dur="indefinite" restart="never" nodeType="tmRoot">
+          <p:childTnLst>
+            <p:seq concurrent="1" nextAc="seek">
+              <p:cTn id="2" dur="indefinite" nodeType="mainSeq">
+                <p:childTnLst>
+                  <p:par>
+                    <p:cTn id="3" fill="hold">
+                      <p:stCondLst>
+                        <p:cond delay="indefinite"/>
+                      </p:stCondLst>
+                      <p:childTnLst>
+                        <p:par>
+                          <p:cTn id="4" fill="hold">
+                            <p:stCondLst>
+                              <p:cond delay="0"/>
+                            </p:stCondLst>
+                            <p:childTnLst>
+                              <p:par>
+                                <p:cTn id="5" presetID="1" presetClass="entr" presetSubtype="0" fill="hold" grpId="0" nodeType="clickEffect">
+                                  <p:stCondLst>
+                                    <p:cond delay="0"/>
+                                  </p:stCondLst>
+                                  <p:childTnLst>
+                                    <p:set>
+                                      <p:cBhvr>
+                                        <p:cTn id="6" dur="1" fill="hold">
+                                          <p:stCondLst>
+                                            <p:cond delay="0"/>
+                                          </p:stCondLst>
+                                        </p:cTn>
+                                        <p:tgtEl>
+                                          <p:spTgt spid="3">
+                                            <p:txEl>
+                                              <p:pRg st="0" end="0"/>
+                                            </p:txEl>
+                                          </p:spTgt>
+                                        </p:tgtEl>
+                                        <p:attrNameLst>
+                                          <p:attrName>style.visibility</p:attrName>
+                                        </p:attrNameLst>
+                                      </p:cBhvr>
+                                      <p:to>
+                                        <p:strVal val="visible"/>
+                                      </p:to>
+                                    </p:set>
+                                  </p:childTnLst>
+                                </p:cTn>
+                              </p:par>
+                            </p:childTnLst>
+                          </p:cTn>
+                        </p:par>
+                      </p:childTnLst>
+                    </p:cTn>
+                  </p:par>
+                  <p:par>
+                    <p:cTn id="7" fill="hold">
+                      <p:stCondLst>
+                        <p:cond delay="indefinite"/>
+                      </p:stCondLst>
+                      <p:childTnLst>
+                        <p:par>
+                          <p:cTn id="8" fill="hold">
+                            <p:stCondLst>
+                              <p:cond delay="0"/>
+                            </p:stCondLst>
+                            <p:childTnLst>
+                              <p:par>
+                                <p:cTn id="9" presetID="1" presetClass="entr" presetSubtype="0" fill="hold" grpId="0" nodeType="clickEffect">
+                                  <p:stCondLst>
+                                    <p:cond delay="0"/>
+                                  </p:stCondLst>
+                                  <p:childTnLst>
+                                    <p:set>
+                                      <p:cBhvr>
+                                        <p:cTn id="10" dur="1" fill="hold">
+                                          <p:stCondLst>
+                                            <p:cond delay="0"/>
+                                          </p:stCondLst>
+                                        </p:cTn>
+                                        <p:tgtEl>
+                                          <p:spTgt spid="3">
+                                            <p:txEl>
+                                              <p:pRg st="1" end="1"/>
+                                            </p:txEl>
+                                          </p:spTgt>
+                                        </p:tgtEl>
+                                        <p:attrNameLst>
+                                          <p:attrName>style.visibility</p:attrName>
+                                        </p:attrNameLst>
+                                      </p:cBhvr>
+                                      <p:to>
+                                        <p:strVal val="visible"/>
+                                      </p:to>
+                                    </p:set>
+                                  </p:childTnLst>
+                                </p:cTn>
+                              </p:par>
+                            </p:childTnLst>
+                          </p:cTn>
+                        </p:par>
+                      </p:childTnLst>
+                    </p:cTn>
+                  </p:par>
+                  <p:par>
+                    <p:cTn id="11" fill="hold">
+                      <p:stCondLst>
+                        <p:cond delay="indefinite"/>
+                      </p:stCondLst>
+                      <p:childTnLst>
+                        <p:par>
+                          <p:cTn id="12" fill="hold">
+                            <p:stCondLst>
+                              <p:cond delay="0"/>
+                            </p:stCondLst>
+                            <p:childTnLst>
+                              <p:par>
+                                <p:cTn id="13" presetID="1" presetClass="entr" presetSubtype="0" fill="hold" grpId="0" nodeType="clickEffect">
+                                  <p:stCondLst>
+                                    <p:cond delay="0"/>
+                                  </p:stCondLst>
+                                  <p:childTnLst>
+                                    <p:set>
+                                      <p:cBhvr>
+                                        <p:cTn id="14" dur="1" fill="hold">
+                                          <p:stCondLst>
+                                            <p:cond delay="0"/>
+                                          </p:stCondLst>
+                                        </p:cTn>
+                                        <p:tgtEl>
+                                          <p:spTgt spid="3">
+                                            <p:txEl>
+                                              <p:pRg st="3" end="3"/>
+                                            </p:txEl>
+                                          </p:spTgt>
+                                        </p:tgtEl>
+                                        <p:attrNameLst>
+                                          <p:attrName>style.visibility</p:attrName>
+                                        </p:attrNameLst>
+                                      </p:cBhvr>
+                                      <p:to>
+                                        <p:strVal val="visible"/>
+                                      </p:to>
+                                    </p:set>
+                                  </p:childTnLst>
+                                </p:cTn>
+                              </p:par>
+                            </p:childTnLst>
+                          </p:cTn>
+                        </p:par>
+                      </p:childTnLst>
+                    </p:cTn>
+                  </p:par>
+                  <p:par>
+                    <p:cTn id="15" fill="hold">
+                      <p:stCondLst>
+                        <p:cond delay="indefinite"/>
+                      </p:stCondLst>
+                      <p:childTnLst>
+                        <p:par>
+                          <p:cTn id="16" fill="hold">
+                            <p:stCondLst>
+                              <p:cond delay="0"/>
+                            </p:stCondLst>
+                            <p:childTnLst>
+                              <p:par>
+                                <p:cTn id="17" presetID="1" presetClass="entr" presetSubtype="0" fill="hold" grpId="0" nodeType="clickEffect">
+                                  <p:stCondLst>
+                                    <p:cond delay="0"/>
+                                  </p:stCondLst>
+                                  <p:childTnLst>
+                                    <p:set>
+                                      <p:cBhvr>
+                                        <p:cTn id="18" dur="1" fill="hold">
+                                          <p:stCondLst>
+                                            <p:cond delay="0"/>
+                                          </p:stCondLst>
+                                        </p:cTn>
+                                        <p:tgtEl>
+                                          <p:spTgt spid="3">
+                                            <p:txEl>
+                                              <p:pRg st="4" end="4"/>
+                                            </p:txEl>
+                                          </p:spTgt>
+                                        </p:tgtEl>
+                                        <p:attrNameLst>
+                                          <p:attrName>style.visibility</p:attrName>
+                                        </p:attrNameLst>
+                                      </p:cBhvr>
+                                      <p:to>
+                                        <p:strVal val="visible"/>
+                                      </p:to>
+                                    </p:set>
+                                  </p:childTnLst>
+                                </p:cTn>
+                              </p:par>
+                            </p:childTnLst>
+                          </p:cTn>
+                        </p:par>
+                      </p:childTnLst>
+                    </p:cTn>
+                  </p:par>
+                  <p:par>
+                    <p:cTn id="19" fill="hold">
+                      <p:stCondLst>
+                        <p:cond delay="indefinite"/>
+                      </p:stCondLst>
+                      <p:childTnLst>
+                        <p:par>
+                          <p:cTn id="20" fill="hold">
+                            <p:stCondLst>
+                              <p:cond delay="0"/>
+                            </p:stCondLst>
+                            <p:childTnLst>
+                              <p:par>
+                                <p:cTn id="21" presetID="1" presetClass="entr" presetSubtype="0" fill="hold" grpId="0" nodeType="clickEffect">
+                                  <p:stCondLst>
+                                    <p:cond delay="0"/>
+                                  </p:stCondLst>
+                                  <p:childTnLst>
+                                    <p:set>
+                                      <p:cBhvr>
+                                        <p:cTn id="22" dur="1" fill="hold">
+                                          <p:stCondLst>
+                                            <p:cond delay="0"/>
+                                          </p:stCondLst>
+                                        </p:cTn>
+                                        <p:tgtEl>
+                                          <p:spTgt spid="3">
+                                            <p:txEl>
+                                              <p:pRg st="6" end="6"/>
+                                            </p:txEl>
+                                          </p:spTgt>
+                                        </p:tgtEl>
+                                        <p:attrNameLst>
+                                          <p:attrName>style.visibility</p:attrName>
+                                        </p:attrNameLst>
+                                      </p:cBhvr>
+                                      <p:to>
+                                        <p:strVal val="visible"/>
+                                      </p:to>
+                                    </p:set>
+                                  </p:childTnLst>
+                                </p:cTn>
+                              </p:par>
+                            </p:childTnLst>
+                          </p:cTn>
+                        </p:par>
+                      </p:childTnLst>
+                    </p:cTn>
+                  </p:par>
+                  <p:par>
+                    <p:cTn id="23" fill="hold">
+                      <p:stCondLst>
+                        <p:cond delay="indefinite"/>
+                      </p:stCondLst>
+                      <p:childTnLst>
+                        <p:par>
+                          <p:cTn id="24" fill="hold">
+                            <p:stCondLst>
+                              <p:cond delay="0"/>
+                            </p:stCondLst>
+                            <p:childTnLst>
+                              <p:par>
+                                <p:cTn id="25" presetID="1" presetClass="entr" presetSubtype="0" fill="hold" grpId="0" nodeType="clickEffect">
+                                  <p:stCondLst>
+                                    <p:cond delay="0"/>
+                                  </p:stCondLst>
+                                  <p:childTnLst>
+                                    <p:set>
+                                      <p:cBhvr>
+                                        <p:cTn id="26" dur="1" fill="hold">
+                                          <p:stCondLst>
+                                            <p:cond delay="0"/>
+                                          </p:stCondLst>
+                                        </p:cTn>
+                                        <p:tgtEl>
+                                          <p:spTgt spid="3">
+                                            <p:txEl>
+                                              <p:pRg st="7" end="7"/>
+                                            </p:txEl>
+                                          </p:spTgt>
+                                        </p:tgtEl>
+                                        <p:attrNameLst>
+                                          <p:attrName>style.visibility</p:attrName>
+                                        </p:attrNameLst>
+                                      </p:cBhvr>
+                                      <p:to>
+                                        <p:strVal val="visible"/>
+                                      </p:to>
+                                    </p:set>
+                                  </p:childTnLst>
+                                </p:cTn>
+                              </p:par>
+                            </p:childTnLst>
+                          </p:cTn>
+                        </p:par>
+                      </p:childTnLst>
+                    </p:cTn>
+                  </p:par>
+                  <p:par>
+                    <p:cTn id="27" fill="hold">
+                      <p:stCondLst>
+                        <p:cond delay="indefinite"/>
+                      </p:stCondLst>
+                      <p:childTnLst>
+                        <p:par>
+                          <p:cTn id="28" fill="hold">
+                            <p:stCondLst>
+                              <p:cond delay="0"/>
+                            </p:stCondLst>
+                            <p:childTnLst>
+                              <p:par>
+                                <p:cTn id="29" presetID="1" presetClass="entr" presetSubtype="0" fill="hold" grpId="0" nodeType="clickEffect">
+                                  <p:stCondLst>
+                                    <p:cond delay="0"/>
+                                  </p:stCondLst>
+                                  <p:childTnLst>
+                                    <p:set>
+                                      <p:cBhvr>
+                                        <p:cTn id="30" dur="1" fill="hold">
+                                          <p:stCondLst>
+                                            <p:cond delay="0"/>
+                                          </p:stCondLst>
+                                        </p:cTn>
+                                        <p:tgtEl>
+                                          <p:spTgt spid="3">
+                                            <p:txEl>
+                                              <p:pRg st="9" end="9"/>
+                                            </p:txEl>
+                                          </p:spTgt>
+                                        </p:tgtEl>
+                                        <p:attrNameLst>
+                                          <p:attrName>style.visibility</p:attrName>
+                                        </p:attrNameLst>
+                                      </p:cBhvr>
+                                      <p:to>
+                                        <p:strVal val="visible"/>
+                                      </p:to>
+                                    </p:set>
+                                  </p:childTnLst>
+                                </p:cTn>
+                              </p:par>
+                            </p:childTnLst>
+                          </p:cTn>
+                        </p:par>
+                      </p:childTnLst>
+                    </p:cTn>
+                  </p:par>
+                  <p:par>
+                    <p:cTn id="31" fill="hold">
+                      <p:stCondLst>
+                        <p:cond delay="indefinite"/>
+                      </p:stCondLst>
+                      <p:childTnLst>
+                        <p:par>
+                          <p:cTn id="32" fill="hold">
+                            <p:stCondLst>
+                              <p:cond delay="0"/>
+                            </p:stCondLst>
+                            <p:childTnLst>
+                              <p:par>
+                                <p:cTn id="33" presetID="1" presetClass="entr" presetSubtype="0" fill="hold" grpId="0" nodeType="clickEffect">
+                                  <p:stCondLst>
+                                    <p:cond delay="0"/>
+                                  </p:stCondLst>
+                                  <p:childTnLst>
+                                    <p:set>
+                                      <p:cBhvr>
+                                        <p:cTn id="34" dur="1" fill="hold">
+                                          <p:stCondLst>
+                                            <p:cond delay="0"/>
+                                          </p:stCondLst>
+                                        </p:cTn>
+                                        <p:tgtEl>
+                                          <p:spTgt spid="3">
+                                            <p:txEl>
+                                              <p:pRg st="10" end="10"/>
+                                            </p:txEl>
+                                          </p:spTgt>
+                                        </p:tgtEl>
+                                        <p:attrNameLst>
+                                          <p:attrName>style.visibility</p:attrName>
+                                        </p:attrNameLst>
+                                      </p:cBhvr>
+                                      <p:to>
+                                        <p:strVal val="visible"/>
+                                      </p:to>
+                                    </p:set>
+                                  </p:childTnLst>
+                                </p:cTn>
+                              </p:par>
+                            </p:childTnLst>
+                          </p:cTn>
+                        </p:par>
+                      </p:childTnLst>
+                    </p:cTn>
+                  </p:par>
+                </p:childTnLst>
+              </p:cTn>
+              <p:prevCondLst>
+                <p:cond evt="onPrev" delay="0">
+                  <p:tgtEl>
+                    <p:sldTgt/>
+                  </p:tgtEl>
+                </p:cond>
+              </p:prevCondLst>
+              <p:nextCondLst>
+                <p:cond evt="onNext" delay="0">
+                  <p:tgtEl>
+                    <p:sldTgt/>
+                  </p:tgtEl>
+                </p:cond>
+              </p:nextCondLst>
+            </p:seq>
+          </p:childTnLst>
+        </p:cTn>
+      </p:par>
+    </p:tnLst>
+    <p:bldLst>
+      <p:bldP spid="3" grpId="0" build="p"/>
+    </p:bldLst>
+  </p:timing>
+</p:sld>
+</file>
+
+<file path=ppt/slides/slide6.xml><?xml version="1.0" encoding="utf-8"?>
+<p:sld xmlns:a="http://schemas.openxmlformats.org/drawingml/2006/main" xmlns:r="http://schemas.openxmlformats.org/officeDocument/2006/relationships" xmlns:p="http://schemas.openxmlformats.org/presentationml/2006/main">
+  <p:cSld>
+    <p:spTree>
+      <p:nvGrpSpPr>
+        <p:cNvPr id="1" name=""/>
+        <p:cNvGrpSpPr/>
+        <p:nvPr/>
+      </p:nvGrpSpPr>
+      <p:grpSpPr>
+        <a:xfrm>
+          <a:off x="0" y="0"/>
+          <a:ext cx="0" cy="0"/>
+          <a:chOff x="0" y="0"/>
+          <a:chExt cx="0" cy="0"/>
+        </a:xfrm>
+      </p:grpSpPr>
+      <p:sp>
+        <p:nvSpPr>
+          <p:cNvPr id="2" name="Titre 1">
+            <a:extLst>
+              <a:ext uri="{FF2B5EF4-FFF2-40B4-BE49-F238E27FC236}">
                 <a16:creationId xmlns:a16="http://schemas.microsoft.com/office/drawing/2014/main" id="{43DE7D65-6535-E64A-072D-1919CF5318E2}"/>
               </a:ext>
             </a:extLst>
@@ -9875,8 +10729,13 @@
           <a:p>
             <a:r>
               <a:rPr lang="fr-CH" dirty="0"/>
-              <a:t>Un peu de code</a:t>
-            </a:r>
+              <a:t>Version sans </a:t>
+            </a:r>
+            <a:r>
+              <a:rPr lang="fr-CH" dirty="0" err="1"/>
+              <a:t>shell</a:t>
+            </a:r>
+            <a:endParaRPr lang="fr-CH" dirty="0"/>
           </a:p>
         </p:txBody>
       </p:sp>
@@ -11822,404 +12681,6 @@
 </p:sld>
 </file>
 
-<file path=ppt/slides/slide6.xml><?xml version="1.0" encoding="utf-8"?>
-<p:sld xmlns:a="http://schemas.openxmlformats.org/drawingml/2006/main" xmlns:r="http://schemas.openxmlformats.org/officeDocument/2006/relationships" xmlns:p="http://schemas.openxmlformats.org/presentationml/2006/main">
-  <p:cSld>
-    <p:spTree>
-      <p:nvGrpSpPr>
-        <p:cNvPr id="1" name=""/>
-        <p:cNvGrpSpPr/>
-        <p:nvPr/>
-      </p:nvGrpSpPr>
-      <p:grpSpPr>
-        <a:xfrm>
-          <a:off x="0" y="0"/>
-          <a:ext cx="0" cy="0"/>
-          <a:chOff x="0" y="0"/>
-          <a:chExt cx="0" cy="0"/>
-        </a:xfrm>
-      </p:grpSpPr>
-      <p:sp>
-        <p:nvSpPr>
-          <p:cNvPr id="2" name="Titre 1">
-            <a:extLst>
-              <a:ext uri="{FF2B5EF4-FFF2-40B4-BE49-F238E27FC236}">
-                <a16:creationId xmlns:a16="http://schemas.microsoft.com/office/drawing/2014/main" id="{0B5D770C-CDCB-8A90-E62D-066555527DB4}"/>
-              </a:ext>
-            </a:extLst>
-          </p:cNvPr>
-          <p:cNvSpPr>
-            <a:spLocks noGrp="1"/>
-          </p:cNvSpPr>
-          <p:nvPr>
-            <p:ph type="title"/>
-          </p:nvPr>
-        </p:nvSpPr>
-        <p:spPr>
-          <a:xfrm>
-            <a:off x="677334" y="704850"/>
-            <a:ext cx="8596668" cy="1320800"/>
-          </a:xfrm>
-        </p:spPr>
-        <p:txBody>
-          <a:bodyPr/>
-          <a:lstStyle/>
-          <a:p>
-            <a:r>
-              <a:rPr lang="fr-CH" dirty="0"/>
-              <a:t>Navigation "modale"</a:t>
-            </a:r>
-          </a:p>
-        </p:txBody>
-      </p:sp>
-      <p:sp>
-        <p:nvSpPr>
-          <p:cNvPr id="3" name="Espace réservé du contenu 2">
-            <a:extLst>
-              <a:ext uri="{FF2B5EF4-FFF2-40B4-BE49-F238E27FC236}">
-                <a16:creationId xmlns:a16="http://schemas.microsoft.com/office/drawing/2014/main" id="{A74388FA-68BC-B588-6ADD-D5F45D572593}"/>
-              </a:ext>
-            </a:extLst>
-          </p:cNvPr>
-          <p:cNvSpPr>
-            <a:spLocks noGrp="1"/>
-          </p:cNvSpPr>
-          <p:nvPr>
-            <p:ph idx="1"/>
-          </p:nvPr>
-        </p:nvSpPr>
-        <p:spPr/>
-        <p:txBody>
-          <a:bodyPr/>
-          <a:lstStyle/>
-          <a:p>
-            <a:r>
-              <a:rPr lang="fr-CH" dirty="0"/>
-              <a:t>Forcer l’utilisateur à réaliser une opération</a:t>
-            </a:r>
-          </a:p>
-          <a:p>
-            <a:r>
-              <a:rPr lang="fr-CH" dirty="0"/>
-              <a:t>Pas de bouton "back"</a:t>
-            </a:r>
-          </a:p>
-          <a:p>
-            <a:r>
-              <a:rPr lang="fr-CH" dirty="0"/>
-              <a:t>Système de pile PUSH/POP comme pour la navigation standard:</a:t>
-            </a:r>
-          </a:p>
-          <a:p>
-            <a:endParaRPr lang="fr-CH" dirty="0"/>
-          </a:p>
-        </p:txBody>
-      </p:sp>
-      <p:sp>
-        <p:nvSpPr>
-          <p:cNvPr id="5" name="ZoneTexte 4">
-            <a:extLst>
-              <a:ext uri="{FF2B5EF4-FFF2-40B4-BE49-F238E27FC236}">
-                <a16:creationId xmlns:a16="http://schemas.microsoft.com/office/drawing/2014/main" id="{60B7C87D-A394-F946-40BC-3C59FC1785F0}"/>
-              </a:ext>
-            </a:extLst>
-          </p:cNvPr>
-          <p:cNvSpPr txBox="1"/>
-          <p:nvPr/>
-        </p:nvSpPr>
-        <p:spPr>
-          <a:xfrm>
-            <a:off x="403933" y="4186020"/>
-            <a:ext cx="9547935" cy="646331"/>
-          </a:xfrm>
-          <a:prstGeom prst="rect">
-            <a:avLst/>
-          </a:prstGeom>
-          <a:noFill/>
-        </p:spPr>
-        <p:txBody>
-          <a:bodyPr wrap="square">
-            <a:spAutoFit/>
-          </a:bodyPr>
-          <a:lstStyle/>
-          <a:p>
-            <a:r>
-              <a:rPr lang="fr-CH" sz="2800" dirty="0" err="1"/>
-              <a:t>await</a:t>
-            </a:r>
-            <a:r>
-              <a:rPr lang="fr-CH" sz="2800" dirty="0"/>
-              <a:t> </a:t>
-            </a:r>
-            <a:r>
-              <a:rPr lang="fr-CH" sz="2800" dirty="0" err="1"/>
-              <a:t>Navigation.Push</a:t>
-            </a:r>
-            <a:r>
-              <a:rPr lang="fr-CH" sz="3600" b="1" dirty="0" err="1"/>
-              <a:t>Modal</a:t>
-            </a:r>
-            <a:r>
-              <a:rPr lang="fr-CH" sz="2800" dirty="0" err="1"/>
-              <a:t>Async</a:t>
-            </a:r>
-            <a:r>
-              <a:rPr lang="fr-CH" sz="2800" dirty="0"/>
-              <a:t>(new </a:t>
-            </a:r>
-            <a:r>
-              <a:rPr lang="fr-CH" sz="2800" dirty="0" err="1"/>
-              <a:t>DetailsPage</a:t>
-            </a:r>
-            <a:r>
-              <a:rPr lang="fr-CH" sz="2800" dirty="0"/>
-              <a:t>());</a:t>
-            </a:r>
-          </a:p>
-        </p:txBody>
-      </p:sp>
-    </p:spTree>
-    <p:extLst>
-      <p:ext uri="{BB962C8B-B14F-4D97-AF65-F5344CB8AC3E}">
-        <p14:creationId xmlns:p14="http://schemas.microsoft.com/office/powerpoint/2010/main" val="4084284261"/>
-      </p:ext>
-    </p:extLst>
-  </p:cSld>
-  <p:clrMapOvr>
-    <a:masterClrMapping/>
-  </p:clrMapOvr>
-  <p:timing>
-    <p:tnLst>
-      <p:par>
-        <p:cTn id="1" dur="indefinite" restart="never" nodeType="tmRoot">
-          <p:childTnLst>
-            <p:seq concurrent="1" nextAc="seek">
-              <p:cTn id="2" dur="indefinite" nodeType="mainSeq">
-                <p:childTnLst>
-                  <p:par>
-                    <p:cTn id="3" fill="hold">
-                      <p:stCondLst>
-                        <p:cond delay="indefinite"/>
-                      </p:stCondLst>
-                      <p:childTnLst>
-                        <p:par>
-                          <p:cTn id="4" fill="hold">
-                            <p:stCondLst>
-                              <p:cond delay="0"/>
-                            </p:stCondLst>
-                            <p:childTnLst>
-                              <p:par>
-                                <p:cTn id="5" presetID="1" presetClass="entr" presetSubtype="0" fill="hold" grpId="0" nodeType="clickEffect">
-                                  <p:stCondLst>
-                                    <p:cond delay="0"/>
-                                  </p:stCondLst>
-                                  <p:childTnLst>
-                                    <p:set>
-                                      <p:cBhvr>
-                                        <p:cTn id="6" dur="1" fill="hold">
-                                          <p:stCondLst>
-                                            <p:cond delay="0"/>
-                                          </p:stCondLst>
-                                        </p:cTn>
-                                        <p:tgtEl>
-                                          <p:spTgt spid="3">
-                                            <p:txEl>
-                                              <p:pRg st="0" end="0"/>
-                                            </p:txEl>
-                                          </p:spTgt>
-                                        </p:tgtEl>
-                                        <p:attrNameLst>
-                                          <p:attrName>style.visibility</p:attrName>
-                                        </p:attrNameLst>
-                                      </p:cBhvr>
-                                      <p:to>
-                                        <p:strVal val="visible"/>
-                                      </p:to>
-                                    </p:set>
-                                  </p:childTnLst>
-                                </p:cTn>
-                              </p:par>
-                            </p:childTnLst>
-                          </p:cTn>
-                        </p:par>
-                      </p:childTnLst>
-                    </p:cTn>
-                  </p:par>
-                  <p:par>
-                    <p:cTn id="7" fill="hold">
-                      <p:stCondLst>
-                        <p:cond delay="indefinite"/>
-                      </p:stCondLst>
-                      <p:childTnLst>
-                        <p:par>
-                          <p:cTn id="8" fill="hold">
-                            <p:stCondLst>
-                              <p:cond delay="0"/>
-                            </p:stCondLst>
-                            <p:childTnLst>
-                              <p:par>
-                                <p:cTn id="9" presetID="1" presetClass="entr" presetSubtype="0" fill="hold" grpId="0" nodeType="clickEffect">
-                                  <p:stCondLst>
-                                    <p:cond delay="0"/>
-                                  </p:stCondLst>
-                                  <p:childTnLst>
-                                    <p:set>
-                                      <p:cBhvr>
-                                        <p:cTn id="10" dur="1" fill="hold">
-                                          <p:stCondLst>
-                                            <p:cond delay="0"/>
-                                          </p:stCondLst>
-                                        </p:cTn>
-                                        <p:tgtEl>
-                                          <p:spTgt spid="3">
-                                            <p:txEl>
-                                              <p:pRg st="1" end="1"/>
-                                            </p:txEl>
-                                          </p:spTgt>
-                                        </p:tgtEl>
-                                        <p:attrNameLst>
-                                          <p:attrName>style.visibility</p:attrName>
-                                        </p:attrNameLst>
-                                      </p:cBhvr>
-                                      <p:to>
-                                        <p:strVal val="visible"/>
-                                      </p:to>
-                                    </p:set>
-                                  </p:childTnLst>
-                                </p:cTn>
-                              </p:par>
-                            </p:childTnLst>
-                          </p:cTn>
-                        </p:par>
-                      </p:childTnLst>
-                    </p:cTn>
-                  </p:par>
-                  <p:par>
-                    <p:cTn id="11" fill="hold">
-                      <p:stCondLst>
-                        <p:cond delay="indefinite"/>
-                      </p:stCondLst>
-                      <p:childTnLst>
-                        <p:par>
-                          <p:cTn id="12" fill="hold">
-                            <p:stCondLst>
-                              <p:cond delay="0"/>
-                            </p:stCondLst>
-                            <p:childTnLst>
-                              <p:par>
-                                <p:cTn id="13" presetID="1" presetClass="entr" presetSubtype="0" fill="hold" grpId="0" nodeType="clickEffect">
-                                  <p:stCondLst>
-                                    <p:cond delay="0"/>
-                                  </p:stCondLst>
-                                  <p:childTnLst>
-                                    <p:set>
-                                      <p:cBhvr>
-                                        <p:cTn id="14" dur="1" fill="hold">
-                                          <p:stCondLst>
-                                            <p:cond delay="0"/>
-                                          </p:stCondLst>
-                                        </p:cTn>
-                                        <p:tgtEl>
-                                          <p:spTgt spid="3">
-                                            <p:txEl>
-                                              <p:pRg st="2" end="2"/>
-                                            </p:txEl>
-                                          </p:spTgt>
-                                        </p:tgtEl>
-                                        <p:attrNameLst>
-                                          <p:attrName>style.visibility</p:attrName>
-                                        </p:attrNameLst>
-                                      </p:cBhvr>
-                                      <p:to>
-                                        <p:strVal val="visible"/>
-                                      </p:to>
-                                    </p:set>
-                                  </p:childTnLst>
-                                </p:cTn>
-                              </p:par>
-                            </p:childTnLst>
-                          </p:cTn>
-                        </p:par>
-                      </p:childTnLst>
-                    </p:cTn>
-                  </p:par>
-                  <p:par>
-                    <p:cTn id="15" fill="hold">
-                      <p:stCondLst>
-                        <p:cond delay="indefinite"/>
-                      </p:stCondLst>
-                      <p:childTnLst>
-                        <p:par>
-                          <p:cTn id="16" fill="hold">
-                            <p:stCondLst>
-                              <p:cond delay="0"/>
-                            </p:stCondLst>
-                            <p:childTnLst>
-                              <p:par>
-                                <p:cTn id="17" presetID="1" presetClass="entr" presetSubtype="0" fill="hold" grpId="0" nodeType="clickEffect">
-                                  <p:stCondLst>
-                                    <p:cond delay="0"/>
-                                  </p:stCondLst>
-                                  <p:iterate type="lt">
-                                    <p:tmAbs val="100"/>
-                                  </p:iterate>
-                                  <p:childTnLst>
-                                    <p:set>
-                                      <p:cBhvr>
-                                        <p:cTn id="18" dur="1" fill="hold">
-                                          <p:stCondLst>
-                                            <p:cond delay="0"/>
-                                          </p:stCondLst>
-                                        </p:cTn>
-                                        <p:tgtEl>
-                                          <p:spTgt spid="5"/>
-                                        </p:tgtEl>
-                                        <p:attrNameLst>
-                                          <p:attrName>style.visibility</p:attrName>
-                                        </p:attrNameLst>
-                                      </p:cBhvr>
-                                      <p:to>
-                                        <p:strVal val="visible"/>
-                                      </p:to>
-                                    </p:set>
-                                  </p:childTnLst>
-                                </p:cTn>
-                              </p:par>
-                            </p:childTnLst>
-                          </p:cTn>
-                        </p:par>
-                      </p:childTnLst>
-                    </p:cTn>
-                  </p:par>
-                </p:childTnLst>
-              </p:cTn>
-              <p:prevCondLst>
-                <p:cond evt="onPrev" delay="0">
-                  <p:tgtEl>
-                    <p:sldTgt/>
-                  </p:tgtEl>
-                </p:cond>
-              </p:prevCondLst>
-              <p:nextCondLst>
-                <p:cond evt="onNext" delay="0">
-                  <p:tgtEl>
-                    <p:sldTgt/>
-                  </p:tgtEl>
-                </p:cond>
-              </p:nextCondLst>
-            </p:seq>
-          </p:childTnLst>
-        </p:cTn>
-      </p:par>
-    </p:tnLst>
-    <p:bldLst>
-      <p:bldP spid="3" grpId="0" build="p"/>
-      <p:bldP spid="5" grpId="0"/>
-    </p:bldLst>
-  </p:timing>
-</p:sld>
-</file>
-
 <file path=ppt/slides/slide7.xml><?xml version="1.0" encoding="utf-8"?>
 <p:sld xmlns:a="http://schemas.openxmlformats.org/drawingml/2006/main" xmlns:r="http://schemas.openxmlformats.org/officeDocument/2006/relationships" xmlns:p="http://schemas.openxmlformats.org/presentationml/2006/main">
   <p:cSld>
@@ -13280,6 +13741,409 @@
 </file>
 
 <file path=ppt/slides/slide8.xml><?xml version="1.0" encoding="utf-8"?>
+<p:sld xmlns:a="http://schemas.openxmlformats.org/drawingml/2006/main" xmlns:r="http://schemas.openxmlformats.org/officeDocument/2006/relationships" xmlns:p="http://schemas.openxmlformats.org/presentationml/2006/main">
+  <p:cSld>
+    <p:spTree>
+      <p:nvGrpSpPr>
+        <p:cNvPr id="1" name=""/>
+        <p:cNvGrpSpPr/>
+        <p:nvPr/>
+      </p:nvGrpSpPr>
+      <p:grpSpPr>
+        <a:xfrm>
+          <a:off x="0" y="0"/>
+          <a:ext cx="0" cy="0"/>
+          <a:chOff x="0" y="0"/>
+          <a:chExt cx="0" cy="0"/>
+        </a:xfrm>
+      </p:grpSpPr>
+      <p:sp>
+        <p:nvSpPr>
+          <p:cNvPr id="2" name="Titre 1">
+            <a:extLst>
+              <a:ext uri="{FF2B5EF4-FFF2-40B4-BE49-F238E27FC236}">
+                <a16:creationId xmlns:a16="http://schemas.microsoft.com/office/drawing/2014/main" id="{0B5D770C-CDCB-8A90-E62D-066555527DB4}"/>
+              </a:ext>
+            </a:extLst>
+          </p:cNvPr>
+          <p:cNvSpPr>
+            <a:spLocks noGrp="1"/>
+          </p:cNvSpPr>
+          <p:nvPr>
+            <p:ph type="title"/>
+          </p:nvPr>
+        </p:nvSpPr>
+        <p:spPr>
+          <a:xfrm>
+            <a:off x="677334" y="704850"/>
+            <a:ext cx="8596668" cy="1320800"/>
+          </a:xfrm>
+        </p:spPr>
+        <p:txBody>
+          <a:bodyPr/>
+          <a:lstStyle/>
+          <a:p>
+            <a:r>
+              <a:rPr lang="fr-CH" dirty="0"/>
+              <a:t>Navigation "modale"</a:t>
+            </a:r>
+          </a:p>
+        </p:txBody>
+      </p:sp>
+      <p:sp>
+        <p:nvSpPr>
+          <p:cNvPr id="3" name="Espace réservé du contenu 2">
+            <a:extLst>
+              <a:ext uri="{FF2B5EF4-FFF2-40B4-BE49-F238E27FC236}">
+                <a16:creationId xmlns:a16="http://schemas.microsoft.com/office/drawing/2014/main" id="{A74388FA-68BC-B588-6ADD-D5F45D572593}"/>
+              </a:ext>
+            </a:extLst>
+          </p:cNvPr>
+          <p:cNvSpPr>
+            <a:spLocks noGrp="1"/>
+          </p:cNvSpPr>
+          <p:nvPr>
+            <p:ph idx="1"/>
+          </p:nvPr>
+        </p:nvSpPr>
+        <p:spPr/>
+        <p:txBody>
+          <a:bodyPr/>
+          <a:lstStyle/>
+          <a:p>
+            <a:r>
+              <a:rPr lang="fr-CH" dirty="0"/>
+              <a:t>Forcer l’utilisateur à réaliser une opération</a:t>
+            </a:r>
+          </a:p>
+          <a:p>
+            <a:r>
+              <a:rPr lang="fr-CH" dirty="0"/>
+              <a:t>Pas de bouton "back"</a:t>
+            </a:r>
+          </a:p>
+          <a:p>
+            <a:r>
+              <a:rPr lang="fr-CH" dirty="0"/>
+              <a:t>Système de pile PUSH/POP comme pour la navigation standard/</a:t>
+            </a:r>
+            <a:r>
+              <a:rPr lang="fr-CH"/>
+              <a:t>shell:</a:t>
+            </a:r>
+            <a:endParaRPr lang="fr-CH" dirty="0"/>
+          </a:p>
+          <a:p>
+            <a:endParaRPr lang="fr-CH" dirty="0"/>
+          </a:p>
+        </p:txBody>
+      </p:sp>
+      <p:sp>
+        <p:nvSpPr>
+          <p:cNvPr id="5" name="ZoneTexte 4">
+            <a:extLst>
+              <a:ext uri="{FF2B5EF4-FFF2-40B4-BE49-F238E27FC236}">
+                <a16:creationId xmlns:a16="http://schemas.microsoft.com/office/drawing/2014/main" id="{60B7C87D-A394-F946-40BC-3C59FC1785F0}"/>
+              </a:ext>
+            </a:extLst>
+          </p:cNvPr>
+          <p:cNvSpPr txBox="1"/>
+          <p:nvPr/>
+        </p:nvSpPr>
+        <p:spPr>
+          <a:xfrm>
+            <a:off x="403933" y="4186020"/>
+            <a:ext cx="9547935" cy="646331"/>
+          </a:xfrm>
+          <a:prstGeom prst="rect">
+            <a:avLst/>
+          </a:prstGeom>
+          <a:noFill/>
+        </p:spPr>
+        <p:txBody>
+          <a:bodyPr wrap="square">
+            <a:spAutoFit/>
+          </a:bodyPr>
+          <a:lstStyle/>
+          <a:p>
+            <a:r>
+              <a:rPr lang="fr-CH" sz="2800" dirty="0" err="1"/>
+              <a:t>await</a:t>
+            </a:r>
+            <a:r>
+              <a:rPr lang="fr-CH" sz="2800" dirty="0"/>
+              <a:t> </a:t>
+            </a:r>
+            <a:r>
+              <a:rPr lang="fr-CH" sz="2800" dirty="0" err="1"/>
+              <a:t>Navigation.Push</a:t>
+            </a:r>
+            <a:r>
+              <a:rPr lang="fr-CH" sz="3600" b="1" dirty="0" err="1"/>
+              <a:t>Modal</a:t>
+            </a:r>
+            <a:r>
+              <a:rPr lang="fr-CH" sz="2800" dirty="0" err="1"/>
+              <a:t>Async</a:t>
+            </a:r>
+            <a:r>
+              <a:rPr lang="fr-CH" sz="2800" dirty="0"/>
+              <a:t>(new </a:t>
+            </a:r>
+            <a:r>
+              <a:rPr lang="fr-CH" sz="2800" dirty="0" err="1"/>
+              <a:t>DetailsPage</a:t>
+            </a:r>
+            <a:r>
+              <a:rPr lang="fr-CH" sz="2800" dirty="0"/>
+              <a:t>());</a:t>
+            </a:r>
+          </a:p>
+        </p:txBody>
+      </p:sp>
+    </p:spTree>
+    <p:extLst>
+      <p:ext uri="{BB962C8B-B14F-4D97-AF65-F5344CB8AC3E}">
+        <p14:creationId xmlns:p14="http://schemas.microsoft.com/office/powerpoint/2010/main" val="4084284261"/>
+      </p:ext>
+    </p:extLst>
+  </p:cSld>
+  <p:clrMapOvr>
+    <a:masterClrMapping/>
+  </p:clrMapOvr>
+  <p:timing>
+    <p:tnLst>
+      <p:par>
+        <p:cTn id="1" dur="indefinite" restart="never" nodeType="tmRoot">
+          <p:childTnLst>
+            <p:seq concurrent="1" nextAc="seek">
+              <p:cTn id="2" dur="indefinite" nodeType="mainSeq">
+                <p:childTnLst>
+                  <p:par>
+                    <p:cTn id="3" fill="hold">
+                      <p:stCondLst>
+                        <p:cond delay="indefinite"/>
+                      </p:stCondLst>
+                      <p:childTnLst>
+                        <p:par>
+                          <p:cTn id="4" fill="hold">
+                            <p:stCondLst>
+                              <p:cond delay="0"/>
+                            </p:stCondLst>
+                            <p:childTnLst>
+                              <p:par>
+                                <p:cTn id="5" presetID="1" presetClass="entr" presetSubtype="0" fill="hold" grpId="0" nodeType="clickEffect">
+                                  <p:stCondLst>
+                                    <p:cond delay="0"/>
+                                  </p:stCondLst>
+                                  <p:childTnLst>
+                                    <p:set>
+                                      <p:cBhvr>
+                                        <p:cTn id="6" dur="1" fill="hold">
+                                          <p:stCondLst>
+                                            <p:cond delay="0"/>
+                                          </p:stCondLst>
+                                        </p:cTn>
+                                        <p:tgtEl>
+                                          <p:spTgt spid="3">
+                                            <p:txEl>
+                                              <p:pRg st="0" end="0"/>
+                                            </p:txEl>
+                                          </p:spTgt>
+                                        </p:tgtEl>
+                                        <p:attrNameLst>
+                                          <p:attrName>style.visibility</p:attrName>
+                                        </p:attrNameLst>
+                                      </p:cBhvr>
+                                      <p:to>
+                                        <p:strVal val="visible"/>
+                                      </p:to>
+                                    </p:set>
+                                  </p:childTnLst>
+                                </p:cTn>
+                              </p:par>
+                            </p:childTnLst>
+                          </p:cTn>
+                        </p:par>
+                      </p:childTnLst>
+                    </p:cTn>
+                  </p:par>
+                  <p:par>
+                    <p:cTn id="7" fill="hold">
+                      <p:stCondLst>
+                        <p:cond delay="indefinite"/>
+                      </p:stCondLst>
+                      <p:childTnLst>
+                        <p:par>
+                          <p:cTn id="8" fill="hold">
+                            <p:stCondLst>
+                              <p:cond delay="0"/>
+                            </p:stCondLst>
+                            <p:childTnLst>
+                              <p:par>
+                                <p:cTn id="9" presetID="1" presetClass="entr" presetSubtype="0" fill="hold" grpId="0" nodeType="clickEffect">
+                                  <p:stCondLst>
+                                    <p:cond delay="0"/>
+                                  </p:stCondLst>
+                                  <p:childTnLst>
+                                    <p:set>
+                                      <p:cBhvr>
+                                        <p:cTn id="10" dur="1" fill="hold">
+                                          <p:stCondLst>
+                                            <p:cond delay="0"/>
+                                          </p:stCondLst>
+                                        </p:cTn>
+                                        <p:tgtEl>
+                                          <p:spTgt spid="3">
+                                            <p:txEl>
+                                              <p:pRg st="1" end="1"/>
+                                            </p:txEl>
+                                          </p:spTgt>
+                                        </p:tgtEl>
+                                        <p:attrNameLst>
+                                          <p:attrName>style.visibility</p:attrName>
+                                        </p:attrNameLst>
+                                      </p:cBhvr>
+                                      <p:to>
+                                        <p:strVal val="visible"/>
+                                      </p:to>
+                                    </p:set>
+                                  </p:childTnLst>
+                                </p:cTn>
+                              </p:par>
+                            </p:childTnLst>
+                          </p:cTn>
+                        </p:par>
+                      </p:childTnLst>
+                    </p:cTn>
+                  </p:par>
+                  <p:par>
+                    <p:cTn id="11" fill="hold">
+                      <p:stCondLst>
+                        <p:cond delay="indefinite"/>
+                      </p:stCondLst>
+                      <p:childTnLst>
+                        <p:par>
+                          <p:cTn id="12" fill="hold">
+                            <p:stCondLst>
+                              <p:cond delay="0"/>
+                            </p:stCondLst>
+                            <p:childTnLst>
+                              <p:par>
+                                <p:cTn id="13" presetID="1" presetClass="entr" presetSubtype="0" fill="hold" grpId="0" nodeType="clickEffect">
+                                  <p:stCondLst>
+                                    <p:cond delay="0"/>
+                                  </p:stCondLst>
+                                  <p:childTnLst>
+                                    <p:set>
+                                      <p:cBhvr>
+                                        <p:cTn id="14" dur="1" fill="hold">
+                                          <p:stCondLst>
+                                            <p:cond delay="0"/>
+                                          </p:stCondLst>
+                                        </p:cTn>
+                                        <p:tgtEl>
+                                          <p:spTgt spid="3">
+                                            <p:txEl>
+                                              <p:pRg st="2" end="2"/>
+                                            </p:txEl>
+                                          </p:spTgt>
+                                        </p:tgtEl>
+                                        <p:attrNameLst>
+                                          <p:attrName>style.visibility</p:attrName>
+                                        </p:attrNameLst>
+                                      </p:cBhvr>
+                                      <p:to>
+                                        <p:strVal val="visible"/>
+                                      </p:to>
+                                    </p:set>
+                                  </p:childTnLst>
+                                </p:cTn>
+                              </p:par>
+                            </p:childTnLst>
+                          </p:cTn>
+                        </p:par>
+                      </p:childTnLst>
+                    </p:cTn>
+                  </p:par>
+                  <p:par>
+                    <p:cTn id="15" fill="hold">
+                      <p:stCondLst>
+                        <p:cond delay="indefinite"/>
+                      </p:stCondLst>
+                      <p:childTnLst>
+                        <p:par>
+                          <p:cTn id="16" fill="hold">
+                            <p:stCondLst>
+                              <p:cond delay="0"/>
+                            </p:stCondLst>
+                            <p:childTnLst>
+                              <p:par>
+                                <p:cTn id="17" presetID="1" presetClass="entr" presetSubtype="0" fill="hold" grpId="0" nodeType="clickEffect">
+                                  <p:stCondLst>
+                                    <p:cond delay="0"/>
+                                  </p:stCondLst>
+                                  <p:iterate type="lt">
+                                    <p:tmAbs val="100"/>
+                                  </p:iterate>
+                                  <p:childTnLst>
+                                    <p:set>
+                                      <p:cBhvr>
+                                        <p:cTn id="18" dur="1" fill="hold">
+                                          <p:stCondLst>
+                                            <p:cond delay="0"/>
+                                          </p:stCondLst>
+                                        </p:cTn>
+                                        <p:tgtEl>
+                                          <p:spTgt spid="5"/>
+                                        </p:tgtEl>
+                                        <p:attrNameLst>
+                                          <p:attrName>style.visibility</p:attrName>
+                                        </p:attrNameLst>
+                                      </p:cBhvr>
+                                      <p:to>
+                                        <p:strVal val="visible"/>
+                                      </p:to>
+                                    </p:set>
+                                  </p:childTnLst>
+                                </p:cTn>
+                              </p:par>
+                            </p:childTnLst>
+                          </p:cTn>
+                        </p:par>
+                      </p:childTnLst>
+                    </p:cTn>
+                  </p:par>
+                </p:childTnLst>
+              </p:cTn>
+              <p:prevCondLst>
+                <p:cond evt="onPrev" delay="0">
+                  <p:tgtEl>
+                    <p:sldTgt/>
+                  </p:tgtEl>
+                </p:cond>
+              </p:prevCondLst>
+              <p:nextCondLst>
+                <p:cond evt="onNext" delay="0">
+                  <p:tgtEl>
+                    <p:sldTgt/>
+                  </p:tgtEl>
+                </p:cond>
+              </p:nextCondLst>
+            </p:seq>
+          </p:childTnLst>
+        </p:cTn>
+      </p:par>
+    </p:tnLst>
+    <p:bldLst>
+      <p:bldP spid="3" grpId="0" build="p"/>
+      <p:bldP spid="5" grpId="0"/>
+    </p:bldLst>
+  </p:timing>
+</p:sld>
+</file>
+
+<file path=ppt/slides/slide9.xml><?xml version="1.0" encoding="utf-8"?>
 <p:sld xmlns:a="http://schemas.openxmlformats.org/drawingml/2006/main" xmlns:r="http://schemas.openxmlformats.org/officeDocument/2006/relationships" xmlns:p="http://schemas.openxmlformats.org/presentationml/2006/main">
   <p:cSld>
     <p:spTree>
@@ -13966,15 +14830,6 @@
 </file>
 
 <file path=customXml/item1.xml><?xml version="1.0" encoding="utf-8"?>
-<?mso-contentType ?>
-<FormTemplates xmlns="http://schemas.microsoft.com/sharepoint/v3/contenttype/forms">
-  <Display>DocumentLibraryForm</Display>
-  <Edit>DocumentLibraryForm</Edit>
-  <New>DocumentLibraryForm</New>
-</FormTemplates>
-</file>
-
-<file path=customXml/item2.xml><?xml version="1.0" encoding="utf-8"?>
 <p:properties xmlns:p="http://schemas.microsoft.com/office/2006/metadata/properties" xmlns:xsi="http://www.w3.org/2001/XMLSchema-instance" xmlns:pc="http://schemas.microsoft.com/office/infopath/2007/PartnerControls">
   <documentManagement>
     <lcf76f155ced4ddcb4097134ff3c332f xmlns="eb2b4dc0-5538-4988-a426-1e3bf3687743">
@@ -13983,6 +14838,15 @@
     <TaxCatchAll xmlns="26488081-7094-48e3-a435-bbb366c5709a" xsi:nil="true"/>
   </documentManagement>
 </p:properties>
+</file>
+
+<file path=customXml/item2.xml><?xml version="1.0" encoding="utf-8"?>
+<?mso-contentType ?>
+<FormTemplates xmlns="http://schemas.microsoft.com/sharepoint/v3/contenttype/forms">
+  <Display>DocumentLibraryForm</Display>
+  <Edit>DocumentLibraryForm</Edit>
+  <New>DocumentLibraryForm</New>
+</FormTemplates>
 </file>
 
 <file path=customXml/item3.xml><?xml version="1.0" encoding="utf-8"?>
@@ -14193,6 +15057,20 @@
 </file>
 
 <file path=customXml/itemProps1.xml><?xml version="1.0" encoding="utf-8"?>
+<ds:datastoreItem xmlns:ds="http://schemas.openxmlformats.org/officeDocument/2006/customXml" ds:itemID="{64E9E499-8660-4A7A-B0D9-752000604051}">
+  <ds:schemaRefs>
+    <ds:schemaRef ds:uri="http://schemas.microsoft.com/office/2006/metadata/properties"/>
+    <ds:schemaRef ds:uri="http://schemas.microsoft.com/office/infopath/2007/PartnerControls"/>
+    <ds:schemaRef ds:uri="http://schemas.microsoft.com/sharepoint/v4"/>
+    <ds:schemaRef ds:uri="bf2f2df3-a963-4452-b0e7-67dabc627c35"/>
+    <ds:schemaRef ds:uri="f7d9f5a6-831d-4621-8c77-cbcaf993e406"/>
+    <ds:schemaRef ds:uri="eb2b4dc0-5538-4988-a426-1e3bf3687743"/>
+    <ds:schemaRef ds:uri="26488081-7094-48e3-a435-bbb366c5709a"/>
+  </ds:schemaRefs>
+</ds:datastoreItem>
+</file>
+
+<file path=customXml/itemProps2.xml><?xml version="1.0" encoding="utf-8"?>
 <ds:datastoreItem xmlns:ds="http://schemas.openxmlformats.org/officeDocument/2006/customXml" ds:itemID="{37980D95-7FED-41C3-BC18-097969BF5B8B}">
   <ds:schemaRefs>
     <ds:schemaRef ds:uri="http://schemas.microsoft.com/sharepoint/v3/contenttype/forms"/>
@@ -14200,18 +15078,21 @@
 </ds:datastoreItem>
 </file>
 
-<file path=customXml/itemProps2.xml><?xml version="1.0" encoding="utf-8"?>
-<ds:datastoreItem xmlns:ds="http://schemas.openxmlformats.org/officeDocument/2006/customXml" ds:itemID="{64E9E499-8660-4A7A-B0D9-752000604051}">
+<file path=customXml/itemProps3.xml><?xml version="1.0" encoding="utf-8"?>
+<ds:datastoreItem xmlns:ds="http://schemas.openxmlformats.org/officeDocument/2006/customXml" ds:itemID="{111B9A83-95A8-41B6-B504-C0C8B7B3064D}">
   <ds:schemaRefs>
+    <ds:schemaRef ds:uri="http://schemas.microsoft.com/office/2006/metadata/contentType"/>
+    <ds:schemaRef ds:uri="http://schemas.microsoft.com/office/2006/metadata/properties/metaAttributes"/>
+    <ds:schemaRef ds:uri="http://www.w3.org/2001/XMLSchema"/>
     <ds:schemaRef ds:uri="http://schemas.microsoft.com/office/2006/metadata/properties"/>
+    <ds:schemaRef ds:uri="eb2b4dc0-5538-4988-a426-1e3bf3687743"/>
+    <ds:schemaRef ds:uri="26488081-7094-48e3-a435-bbb366c5709a"/>
+    <ds:schemaRef ds:uri="http://schemas.microsoft.com/office/2006/documentManagement/types"/>
     <ds:schemaRef ds:uri="http://schemas.microsoft.com/office/infopath/2007/PartnerControls"/>
-    <ds:schemaRef ds:uri="http://schemas.microsoft.com/sharepoint/v4"/>
-    <ds:schemaRef ds:uri="bf2f2df3-a963-4452-b0e7-67dabc627c35"/>
-    <ds:schemaRef ds:uri="f7d9f5a6-831d-4621-8c77-cbcaf993e406"/>
+    <ds:schemaRef ds:uri="http://schemas.openxmlformats.org/package/2006/metadata/core-properties"/>
+    <ds:schemaRef ds:uri="http://purl.org/dc/elements/1.1/"/>
+    <ds:schemaRef ds:uri="http://purl.org/dc/terms/"/>
+    <ds:schemaRef ds:uri="http://schemas.microsoft.com/internal/obd"/>
   </ds:schemaRefs>
 </ds:datastoreItem>
-</file>
-
-<file path=customXml/itemProps3.xml><?xml version="1.0" encoding="utf-8"?>
-<ds:datastoreItem xmlns:ds="http://schemas.openxmlformats.org/officeDocument/2006/customXml" ds:itemID="{111B9A83-95A8-41B6-B504-C0C8B7B3064D}"/>
 </file>
</xml_diff>